<commit_message>
first round editing finished
</commit_message>
<xml_diff>
--- a/figures.pptx
+++ b/figures.pptx
@@ -8,6 +8,7 @@
     <p:sldId id="256" r:id="rId2"/>
     <p:sldId id="257" r:id="rId3"/>
     <p:sldId id="258" r:id="rId4"/>
+    <p:sldId id="259" r:id="rId5"/>
   </p:sldIdLst>
   <p:sldSz cx="9144000" cy="6858000" type="screen4x3"/>
   <p:notesSz cx="6858000" cy="9144000"/>
@@ -290,7 +291,7 @@
           <a:p>
             <a:fld id="{8090EFCE-2913-2348-8E8B-D415B47A375C}" type="datetimeFigureOut">
               <a:rPr kumimoji="1" lang="zh-CN" altLang="en-US" smtClean="0"/>
-              <a:t>4/20/15</a:t>
+              <a:t>4/21/15</a:t>
             </a:fld>
             <a:endParaRPr kumimoji="1" lang="zh-CN" altLang="en-US"/>
           </a:p>
@@ -460,7 +461,7 @@
           <a:p>
             <a:fld id="{8090EFCE-2913-2348-8E8B-D415B47A375C}" type="datetimeFigureOut">
               <a:rPr kumimoji="1" lang="zh-CN" altLang="en-US" smtClean="0"/>
-              <a:t>4/20/15</a:t>
+              <a:t>4/21/15</a:t>
             </a:fld>
             <a:endParaRPr kumimoji="1" lang="zh-CN" altLang="en-US"/>
           </a:p>
@@ -640,7 +641,7 @@
           <a:p>
             <a:fld id="{8090EFCE-2913-2348-8E8B-D415B47A375C}" type="datetimeFigureOut">
               <a:rPr kumimoji="1" lang="zh-CN" altLang="en-US" smtClean="0"/>
-              <a:t>4/20/15</a:t>
+              <a:t>4/21/15</a:t>
             </a:fld>
             <a:endParaRPr kumimoji="1" lang="zh-CN" altLang="en-US"/>
           </a:p>
@@ -810,7 +811,7 @@
           <a:p>
             <a:fld id="{8090EFCE-2913-2348-8E8B-D415B47A375C}" type="datetimeFigureOut">
               <a:rPr kumimoji="1" lang="zh-CN" altLang="en-US" smtClean="0"/>
-              <a:t>4/20/15</a:t>
+              <a:t>4/21/15</a:t>
             </a:fld>
             <a:endParaRPr kumimoji="1" lang="zh-CN" altLang="en-US"/>
           </a:p>
@@ -1056,7 +1057,7 @@
           <a:p>
             <a:fld id="{8090EFCE-2913-2348-8E8B-D415B47A375C}" type="datetimeFigureOut">
               <a:rPr kumimoji="1" lang="zh-CN" altLang="en-US" smtClean="0"/>
-              <a:t>4/20/15</a:t>
+              <a:t>4/21/15</a:t>
             </a:fld>
             <a:endParaRPr kumimoji="1" lang="zh-CN" altLang="en-US"/>
           </a:p>
@@ -1344,7 +1345,7 @@
           <a:p>
             <a:fld id="{8090EFCE-2913-2348-8E8B-D415B47A375C}" type="datetimeFigureOut">
               <a:rPr kumimoji="1" lang="zh-CN" altLang="en-US" smtClean="0"/>
-              <a:t>4/20/15</a:t>
+              <a:t>4/21/15</a:t>
             </a:fld>
             <a:endParaRPr kumimoji="1" lang="zh-CN" altLang="en-US"/>
           </a:p>
@@ -1766,7 +1767,7 @@
           <a:p>
             <a:fld id="{8090EFCE-2913-2348-8E8B-D415B47A375C}" type="datetimeFigureOut">
               <a:rPr kumimoji="1" lang="zh-CN" altLang="en-US" smtClean="0"/>
-              <a:t>4/20/15</a:t>
+              <a:t>4/21/15</a:t>
             </a:fld>
             <a:endParaRPr kumimoji="1" lang="zh-CN" altLang="en-US"/>
           </a:p>
@@ -1884,7 +1885,7 @@
           <a:p>
             <a:fld id="{8090EFCE-2913-2348-8E8B-D415B47A375C}" type="datetimeFigureOut">
               <a:rPr kumimoji="1" lang="zh-CN" altLang="en-US" smtClean="0"/>
-              <a:t>4/20/15</a:t>
+              <a:t>4/21/15</a:t>
             </a:fld>
             <a:endParaRPr kumimoji="1" lang="zh-CN" altLang="en-US"/>
           </a:p>
@@ -1979,7 +1980,7 @@
           <a:p>
             <a:fld id="{8090EFCE-2913-2348-8E8B-D415B47A375C}" type="datetimeFigureOut">
               <a:rPr kumimoji="1" lang="zh-CN" altLang="en-US" smtClean="0"/>
-              <a:t>4/20/15</a:t>
+              <a:t>4/21/15</a:t>
             </a:fld>
             <a:endParaRPr kumimoji="1" lang="zh-CN" altLang="en-US"/>
           </a:p>
@@ -2256,7 +2257,7 @@
           <a:p>
             <a:fld id="{8090EFCE-2913-2348-8E8B-D415B47A375C}" type="datetimeFigureOut">
               <a:rPr kumimoji="1" lang="zh-CN" altLang="en-US" smtClean="0"/>
-              <a:t>4/20/15</a:t>
+              <a:t>4/21/15</a:t>
             </a:fld>
             <a:endParaRPr kumimoji="1" lang="zh-CN" altLang="en-US"/>
           </a:p>
@@ -2509,7 +2510,7 @@
           <a:p>
             <a:fld id="{8090EFCE-2913-2348-8E8B-D415B47A375C}" type="datetimeFigureOut">
               <a:rPr kumimoji="1" lang="zh-CN" altLang="en-US" smtClean="0"/>
-              <a:t>4/20/15</a:t>
+              <a:t>4/21/15</a:t>
             </a:fld>
             <a:endParaRPr kumimoji="1" lang="zh-CN" altLang="en-US"/>
           </a:p>
@@ -2722,7 +2723,7 @@
           <a:p>
             <a:fld id="{8090EFCE-2913-2348-8E8B-D415B47A375C}" type="datetimeFigureOut">
               <a:rPr kumimoji="1" lang="zh-CN" altLang="en-US" smtClean="0"/>
-              <a:t>4/20/15</a:t>
+              <a:t>4/21/15</a:t>
             </a:fld>
             <a:endParaRPr kumimoji="1" lang="zh-CN" altLang="en-US"/>
           </a:p>
@@ -3198,7 +3199,7 @@
           <a:prstGeom prst="rect">
             <a:avLst/>
           </a:prstGeom>
-          <a:ln/>
+          <a:ln w="1270"/>
         </p:spPr>
         <p:style>
           <a:lnRef idx="2">
@@ -3218,12 +3219,16 @@
           <a:bodyPr/>
           <a:lstStyle/>
           <a:p>
-            <a:pPr algn="ctr"/>
-            <a:r>
-              <a:rPr lang="en-US" altLang="zh-CN" dirty="0" smtClean="0"/>
+            <a:pPr algn="ctr">
+              <a:lnSpc>
+                <a:spcPct val="150000"/>
+              </a:lnSpc>
+            </a:pPr>
+            <a:r>
+              <a:rPr lang="en-US" altLang="zh-CN" sz="1100" dirty="0" smtClean="0"/>
               <a:t>Audio</a:t>
             </a:r>
-            <a:endParaRPr lang="zh-CN" altLang="en-US" dirty="0"/>
+            <a:endParaRPr lang="zh-CN" altLang="en-US" sz="1100" dirty="0"/>
           </a:p>
         </p:txBody>
       </p:sp>
@@ -3241,7 +3246,7 @@
           <a:prstGeom prst="rect">
             <a:avLst/>
           </a:prstGeom>
-          <a:ln/>
+          <a:ln w="1270"/>
         </p:spPr>
         <p:style>
           <a:lnRef idx="2">
@@ -3261,12 +3266,16 @@
           <a:bodyPr/>
           <a:lstStyle/>
           <a:p>
-            <a:pPr algn="ctr"/>
-            <a:r>
-              <a:rPr lang="en-US" altLang="zh-CN" dirty="0" smtClean="0"/>
+            <a:pPr algn="ctr">
+              <a:lnSpc>
+                <a:spcPct val="150000"/>
+              </a:lnSpc>
+            </a:pPr>
+            <a:r>
+              <a:rPr lang="en-US" altLang="zh-CN" sz="1100" dirty="0" smtClean="0"/>
               <a:t>CQT+PCA</a:t>
             </a:r>
-            <a:endParaRPr lang="zh-CN" altLang="en-US" dirty="0"/>
+            <a:endParaRPr lang="zh-CN" altLang="en-US" sz="1100" dirty="0"/>
           </a:p>
         </p:txBody>
       </p:sp>
@@ -3287,7 +3296,7 @@
           <a:prstGeom prst="straightConnector1">
             <a:avLst/>
           </a:prstGeom>
-          <a:ln>
+          <a:ln w="1270">
             <a:solidFill>
               <a:schemeClr val="tx1"/>
             </a:solidFill>
@@ -3317,13 +3326,13 @@
         </p:nvSpPr>
         <p:spPr>
           <a:xfrm>
-            <a:off x="4029468" y="3491426"/>
+            <a:off x="4029468" y="3505081"/>
             <a:ext cx="1069529" cy="384171"/>
           </a:xfrm>
           <a:prstGeom prst="rect">
             <a:avLst/>
           </a:prstGeom>
-          <a:ln/>
+          <a:ln w="1270"/>
         </p:spPr>
         <p:style>
           <a:lnRef idx="2">
@@ -3364,13 +3373,13 @@
         </p:nvCxnSpPr>
         <p:spPr>
           <a:xfrm flipH="1">
-            <a:off x="4566823" y="3225739"/>
+            <a:off x="4566823" y="3239394"/>
             <a:ext cx="2589" cy="246492"/>
           </a:xfrm>
           <a:prstGeom prst="straightConnector1">
             <a:avLst/>
           </a:prstGeom>
-          <a:ln>
+          <a:ln w="1270">
             <a:solidFill>
               <a:schemeClr val="tx1"/>
             </a:solidFill>
@@ -3413,7 +3422,7 @@
               <a:alpha val="75000"/>
             </a:schemeClr>
           </a:solidFill>
-          <a:ln w="6350" cmpd="sng">
+          <a:ln w="1270" cmpd="sng">
             <a:solidFill>
               <a:schemeClr val="tx1"/>
             </a:solidFill>
@@ -3438,8 +3447,12 @@
           <a:bodyPr rtlCol="0" anchor="ctr"/>
           <a:lstStyle/>
           <a:p>
-            <a:pPr algn="ctr"/>
-            <a:endParaRPr kumimoji="1" lang="zh-CN" altLang="en-US">
+            <a:pPr algn="ctr">
+              <a:lnSpc>
+                <a:spcPct val="150000"/>
+              </a:lnSpc>
+            </a:pPr>
+            <a:endParaRPr kumimoji="1" lang="zh-CN" altLang="en-US" sz="1100">
               <a:solidFill>
                 <a:schemeClr val="tx1"/>
               </a:solidFill>
@@ -3461,7 +3474,7 @@
           <a:prstGeom prst="straightConnector1">
             <a:avLst/>
           </a:prstGeom>
-          <a:ln>
+          <a:ln w="1270">
             <a:solidFill>
               <a:schemeClr val="tx1"/>
             </a:solidFill>
@@ -3497,7 +3510,7 @@
           <a:prstGeom prst="rect">
             <a:avLst/>
           </a:prstGeom>
-          <a:ln/>
+          <a:ln w="1270"/>
         </p:spPr>
         <p:style>
           <a:lnRef idx="2">
@@ -3517,30 +3530,37 @@
           <a:bodyPr/>
           <a:lstStyle/>
           <a:p>
-            <a:pPr algn="ctr"/>
-            <a:r>
-              <a:rPr lang="en-US" altLang="zh-CN" dirty="0" smtClean="0"/>
+            <a:pPr algn="ctr">
+              <a:lnSpc>
+                <a:spcPct val="150000"/>
+              </a:lnSpc>
+            </a:pPr>
+            <a:r>
+              <a:rPr lang="en-US" altLang="zh-CN" sz="1100" dirty="0" smtClean="0"/>
               <a:t>Pre-train</a:t>
             </a:r>
-            <a:endParaRPr lang="zh-CN" altLang="en-US" dirty="0"/>
+            <a:endParaRPr lang="zh-CN" altLang="en-US" sz="1100" dirty="0"/>
           </a:p>
         </p:txBody>
       </p:sp>
       <p:cxnSp>
         <p:nvCxnSpPr>
           <p:cNvPr id="17" name="直线箭头连接符 16"/>
-          <p:cNvCxnSpPr/>
+          <p:cNvCxnSpPr>
+            <a:stCxn id="16" idx="2"/>
+            <a:endCxn id="18" idx="0"/>
+          </p:cNvCxnSpPr>
           <p:nvPr/>
         </p:nvCxnSpPr>
         <p:spPr>
           <a:xfrm flipH="1">
-            <a:off x="4580820" y="4527670"/>
-            <a:ext cx="2589" cy="246492"/>
+            <a:off x="4564231" y="4527670"/>
+            <a:ext cx="2" cy="270883"/>
           </a:xfrm>
           <a:prstGeom prst="straightConnector1">
             <a:avLst/>
           </a:prstGeom>
-          <a:ln>
+          <a:ln w="1270">
             <a:solidFill>
               <a:schemeClr val="tx1"/>
             </a:solidFill>
@@ -3570,56 +3590,13 @@
         </p:nvSpPr>
         <p:spPr>
           <a:xfrm>
-            <a:off x="4029469" y="4798029"/>
+            <a:off x="4029467" y="4798553"/>
             <a:ext cx="1069528" cy="384171"/>
           </a:xfrm>
           <a:prstGeom prst="rect">
             <a:avLst/>
           </a:prstGeom>
-          <a:ln/>
-        </p:spPr>
-        <p:style>
-          <a:lnRef idx="2">
-            <a:schemeClr val="dk1"/>
-          </a:lnRef>
-          <a:fillRef idx="1">
-            <a:schemeClr val="lt1"/>
-          </a:fillRef>
-          <a:effectRef idx="0">
-            <a:schemeClr val="dk1"/>
-          </a:effectRef>
-          <a:fontRef idx="minor">
-            <a:schemeClr val="dk1"/>
-          </a:fontRef>
-        </p:style>
-        <p:txBody>
-          <a:bodyPr/>
-          <a:lstStyle/>
-          <a:p>
-            <a:pPr algn="ctr"/>
-            <a:r>
-              <a:rPr lang="en-US" altLang="zh-CN" dirty="0" smtClean="0"/>
-              <a:t>Fine-tune</a:t>
-            </a:r>
-            <a:endParaRPr lang="zh-CN" altLang="en-US" dirty="0"/>
-          </a:p>
-        </p:txBody>
-      </p:sp>
-      <p:sp>
-        <p:nvSpPr>
-          <p:cNvPr id="19" name="矩形 18"/>
-          <p:cNvSpPr/>
-          <p:nvPr/>
-        </p:nvSpPr>
-        <p:spPr>
-          <a:xfrm>
-            <a:off x="4029467" y="5455645"/>
-            <a:ext cx="1069531" cy="384171"/>
-          </a:xfrm>
-          <a:prstGeom prst="rect">
-            <a:avLst/>
-          </a:prstGeom>
-          <a:ln/>
+          <a:ln w="1270"/>
         </p:spPr>
         <p:style>
           <a:lnRef idx="2">
@@ -3645,6 +3622,53 @@
               </a:lnSpc>
             </a:pPr>
             <a:r>
+              <a:rPr lang="en-US" altLang="zh-CN" sz="1100" dirty="0" smtClean="0"/>
+              <a:t>Fine-tune</a:t>
+            </a:r>
+            <a:endParaRPr lang="zh-CN" altLang="en-US" sz="1100" dirty="0"/>
+          </a:p>
+        </p:txBody>
+      </p:sp>
+      <p:sp>
+        <p:nvSpPr>
+          <p:cNvPr id="19" name="矩形 18"/>
+          <p:cNvSpPr/>
+          <p:nvPr/>
+        </p:nvSpPr>
+        <p:spPr>
+          <a:xfrm>
+            <a:off x="4029467" y="5428335"/>
+            <a:ext cx="1069531" cy="384171"/>
+          </a:xfrm>
+          <a:prstGeom prst="rect">
+            <a:avLst/>
+          </a:prstGeom>
+          <a:ln w="1270"/>
+        </p:spPr>
+        <p:style>
+          <a:lnRef idx="2">
+            <a:schemeClr val="dk1"/>
+          </a:lnRef>
+          <a:fillRef idx="1">
+            <a:schemeClr val="lt1"/>
+          </a:fillRef>
+          <a:effectRef idx="0">
+            <a:schemeClr val="dk1"/>
+          </a:effectRef>
+          <a:fontRef idx="minor">
+            <a:schemeClr val="dk1"/>
+          </a:fontRef>
+        </p:style>
+        <p:txBody>
+          <a:bodyPr/>
+          <a:lstStyle/>
+          <a:p>
+            <a:pPr algn="ctr">
+              <a:lnSpc>
+                <a:spcPct val="150000"/>
+              </a:lnSpc>
+            </a:pPr>
+            <a:r>
               <a:rPr lang="en-US" altLang="zh-CN" sz="1050" dirty="0" smtClean="0"/>
               <a:t>Post-processing</a:t>
             </a:r>
@@ -3666,7 +3690,7 @@
           <a:prstGeom prst="straightConnector1">
             <a:avLst/>
           </a:prstGeom>
-          <a:ln>
+          <a:ln w="1270">
             <a:solidFill>
               <a:schemeClr val="tx1"/>
             </a:solidFill>
@@ -3696,7 +3720,7 @@
         </p:nvSpPr>
         <p:spPr>
           <a:xfrm>
-            <a:off x="3772249" y="5383394"/>
+            <a:off x="3772249" y="5369739"/>
             <a:ext cx="1636073" cy="542208"/>
           </a:xfrm>
           <a:prstGeom prst="frame">
@@ -3709,7 +3733,7 @@
               <a:alpha val="75000"/>
             </a:schemeClr>
           </a:solidFill>
-          <a:ln w="6350" cmpd="sng">
+          <a:ln w="1270" cmpd="sng">
             <a:solidFill>
               <a:schemeClr val="tx1"/>
             </a:solidFill>
@@ -3734,8 +3758,12 @@
           <a:bodyPr rtlCol="0" anchor="ctr"/>
           <a:lstStyle/>
           <a:p>
-            <a:pPr algn="ctr"/>
-            <a:endParaRPr kumimoji="1" lang="zh-CN" altLang="en-US">
+            <a:pPr algn="ctr">
+              <a:lnSpc>
+                <a:spcPct val="150000"/>
+              </a:lnSpc>
+            </a:pPr>
+            <a:endParaRPr kumimoji="1" lang="zh-CN" altLang="en-US" sz="1100">
               <a:solidFill>
                 <a:schemeClr val="tx1"/>
               </a:solidFill>
@@ -3751,13 +3779,13 @@
         </p:nvSpPr>
         <p:spPr>
           <a:xfrm>
-            <a:off x="5741601" y="3175976"/>
-            <a:ext cx="1457769" cy="384171"/>
+            <a:off x="5741602" y="3175976"/>
+            <a:ext cx="1072446" cy="384171"/>
           </a:xfrm>
           <a:prstGeom prst="rect">
             <a:avLst/>
           </a:prstGeom>
-          <a:ln/>
+          <a:ln w="1270"/>
         </p:spPr>
         <p:style>
           <a:lnRef idx="2">
@@ -3777,20 +3805,24 @@
           <a:bodyPr/>
           <a:lstStyle/>
           <a:p>
-            <a:pPr algn="ctr"/>
-            <a:r>
-              <a:rPr lang="en-US" altLang="zh-CN" dirty="0" smtClean="0"/>
+            <a:pPr algn="ctr">
+              <a:lnSpc>
+                <a:spcPct val="150000"/>
+              </a:lnSpc>
+            </a:pPr>
+            <a:r>
+              <a:rPr lang="en-US" altLang="zh-CN" sz="1100" dirty="0" smtClean="0"/>
               <a:t>Time</a:t>
             </a:r>
             <a:r>
-              <a:rPr lang="zh-CN" altLang="en-US" dirty="0" smtClean="0"/>
+              <a:rPr lang="zh-CN" altLang="en-US" sz="1100" dirty="0" smtClean="0"/>
               <a:t> </a:t>
             </a:r>
             <a:r>
-              <a:rPr lang="en-US" altLang="zh-CN" dirty="0" smtClean="0"/>
+              <a:rPr lang="en-US" altLang="zh-CN" sz="1100" dirty="0" smtClean="0"/>
               <a:t>Splicing</a:t>
             </a:r>
-            <a:endParaRPr lang="zh-CN" altLang="en-US" dirty="0"/>
+            <a:endParaRPr lang="zh-CN" altLang="en-US" sz="1100" dirty="0"/>
           </a:p>
         </p:txBody>
       </p:sp>
@@ -3803,12 +3835,12 @@
         <p:spPr>
           <a:xfrm>
             <a:off x="5741601" y="3754078"/>
-            <a:ext cx="1457769" cy="384171"/>
+            <a:ext cx="1072447" cy="384171"/>
           </a:xfrm>
           <a:prstGeom prst="rect">
             <a:avLst/>
           </a:prstGeom>
-          <a:ln/>
+          <a:ln w="1270"/>
         </p:spPr>
         <p:style>
           <a:lnRef idx="2">
@@ -3828,38 +3860,44 @@
           <a:bodyPr/>
           <a:lstStyle/>
           <a:p>
-            <a:pPr algn="ctr"/>
-            <a:r>
-              <a:rPr lang="en-US" altLang="zh-CN" dirty="0" smtClean="0"/>
+            <a:pPr algn="ctr">
+              <a:lnSpc>
+                <a:spcPct val="150000"/>
+              </a:lnSpc>
+            </a:pPr>
+            <a:r>
+              <a:rPr lang="en-US" altLang="zh-CN" sz="1100" dirty="0" smtClean="0"/>
               <a:t>Filter</a:t>
             </a:r>
             <a:r>
-              <a:rPr lang="zh-CN" altLang="en-US" dirty="0" smtClean="0"/>
+              <a:rPr lang="zh-CN" altLang="en-US" sz="1100" dirty="0" smtClean="0"/>
               <a:t> </a:t>
             </a:r>
             <a:r>
-              <a:rPr lang="en-US" altLang="zh-CN" dirty="0" smtClean="0"/>
+              <a:rPr lang="en-US" altLang="zh-CN" sz="1100" dirty="0" smtClean="0"/>
               <a:t>Splicing</a:t>
             </a:r>
-            <a:endParaRPr lang="zh-CN" altLang="en-US" dirty="0"/>
+            <a:endParaRPr lang="zh-CN" altLang="en-US" sz="1100" dirty="0"/>
           </a:p>
         </p:txBody>
       </p:sp>
       <p:cxnSp>
         <p:nvCxnSpPr>
           <p:cNvPr id="24" name="直线箭头连接符 23"/>
-          <p:cNvCxnSpPr/>
+          <p:cNvCxnSpPr>
+            <a:endCxn id="22" idx="1"/>
+          </p:cNvCxnSpPr>
           <p:nvPr/>
         </p:nvCxnSpPr>
         <p:spPr>
           <a:xfrm flipV="1">
-            <a:off x="5408322" y="3447213"/>
-            <a:ext cx="290820" cy="230139"/>
+            <a:off x="5408322" y="3368062"/>
+            <a:ext cx="333280" cy="309292"/>
           </a:xfrm>
           <a:prstGeom prst="straightConnector1">
             <a:avLst/>
           </a:prstGeom>
-          <a:ln>
+          <a:ln w="1270">
             <a:solidFill>
               <a:schemeClr val="tx1"/>
             </a:solidFill>
@@ -3897,7 +3935,7 @@
           <a:prstGeom prst="straightConnector1">
             <a:avLst/>
           </a:prstGeom>
-          <a:ln>
+          <a:ln w="1270">
             <a:solidFill>
               <a:schemeClr val="tx1"/>
             </a:solidFill>
@@ -3928,12 +3966,12 @@
         <p:spPr>
           <a:xfrm>
             <a:off x="5741601" y="5155414"/>
-            <a:ext cx="1457769" cy="384171"/>
+            <a:ext cx="1072447" cy="384171"/>
           </a:xfrm>
           <a:prstGeom prst="rect">
             <a:avLst/>
           </a:prstGeom>
-          <a:ln/>
+          <a:ln w="1270"/>
         </p:spPr>
         <p:style>
           <a:lnRef idx="2">
@@ -3953,12 +3991,16 @@
           <a:bodyPr/>
           <a:lstStyle/>
           <a:p>
-            <a:pPr algn="ctr"/>
-            <a:r>
-              <a:rPr lang="en-US" altLang="zh-CN" dirty="0" smtClean="0"/>
+            <a:pPr algn="ctr">
+              <a:lnSpc>
+                <a:spcPct val="150000"/>
+              </a:lnSpc>
+            </a:pPr>
+            <a:r>
+              <a:rPr lang="en-US" altLang="zh-CN" sz="1100" dirty="0" smtClean="0"/>
               <a:t>SVMs</a:t>
             </a:r>
-            <a:endParaRPr lang="zh-CN" altLang="en-US" dirty="0"/>
+            <a:endParaRPr lang="zh-CN" altLang="en-US" sz="1100" dirty="0"/>
           </a:p>
         </p:txBody>
       </p:sp>
@@ -3971,12 +4013,12 @@
         <p:spPr>
           <a:xfrm>
             <a:off x="5741601" y="5733516"/>
-            <a:ext cx="1457769" cy="384171"/>
+            <a:ext cx="1072447" cy="384171"/>
           </a:xfrm>
           <a:prstGeom prst="rect">
             <a:avLst/>
           </a:prstGeom>
-          <a:ln/>
+          <a:ln w="1270"/>
         </p:spPr>
         <p:style>
           <a:lnRef idx="2">
@@ -3996,30 +4038,36 @@
           <a:bodyPr/>
           <a:lstStyle/>
           <a:p>
-            <a:pPr algn="ctr"/>
-            <a:r>
-              <a:rPr lang="en-US" altLang="zh-CN" dirty="0" smtClean="0"/>
+            <a:pPr algn="ctr">
+              <a:lnSpc>
+                <a:spcPct val="150000"/>
+              </a:lnSpc>
+            </a:pPr>
+            <a:r>
+              <a:rPr lang="en-US" altLang="zh-CN" sz="1100" dirty="0" smtClean="0"/>
               <a:t>HMMs</a:t>
             </a:r>
-            <a:endParaRPr lang="zh-CN" altLang="en-US" dirty="0"/>
+            <a:endParaRPr lang="zh-CN" altLang="en-US" sz="1100" dirty="0"/>
           </a:p>
         </p:txBody>
       </p:sp>
       <p:cxnSp>
         <p:nvCxnSpPr>
           <p:cNvPr id="32" name="直线箭头连接符 31"/>
-          <p:cNvCxnSpPr/>
+          <p:cNvCxnSpPr>
+            <a:endCxn id="30" idx="1"/>
+          </p:cNvCxnSpPr>
           <p:nvPr/>
         </p:nvCxnSpPr>
         <p:spPr>
           <a:xfrm flipV="1">
-            <a:off x="5408322" y="5372031"/>
-            <a:ext cx="290820" cy="230139"/>
+            <a:off x="5408322" y="5347500"/>
+            <a:ext cx="333279" cy="254672"/>
           </a:xfrm>
           <a:prstGeom prst="straightConnector1">
             <a:avLst/>
           </a:prstGeom>
-          <a:ln>
+          <a:ln w="1270">
             <a:solidFill>
               <a:schemeClr val="tx1"/>
             </a:solidFill>
@@ -4055,7 +4103,7 @@
           <a:prstGeom prst="straightConnector1">
             <a:avLst/>
           </a:prstGeom>
-          <a:ln>
+          <a:ln w="1270">
             <a:solidFill>
               <a:schemeClr val="tx1"/>
             </a:solidFill>
@@ -4098,7 +4146,7 @@
               <a:alpha val="75000"/>
             </a:schemeClr>
           </a:solidFill>
-          <a:ln w="6350" cmpd="sng">
+          <a:ln w="1270" cmpd="sng">
             <a:solidFill>
               <a:schemeClr val="tx1"/>
             </a:solidFill>
@@ -4123,8 +4171,12 @@
           <a:bodyPr rtlCol="0" anchor="ctr"/>
           <a:lstStyle/>
           <a:p>
-            <a:pPr algn="ctr"/>
-            <a:endParaRPr kumimoji="1" lang="zh-CN" altLang="en-US">
+            <a:pPr algn="ctr">
+              <a:lnSpc>
+                <a:spcPct val="150000"/>
+              </a:lnSpc>
+            </a:pPr>
+            <a:endParaRPr kumimoji="1" lang="zh-CN" altLang="en-US" sz="1100">
               <a:solidFill>
                 <a:schemeClr val="tx1"/>
               </a:solidFill>
@@ -4146,7 +4198,7 @@
           <a:prstGeom prst="straightConnector1">
             <a:avLst/>
           </a:prstGeom>
-          <a:ln>
+          <a:ln w="1270">
             <a:solidFill>
               <a:schemeClr val="tx1"/>
             </a:solidFill>
@@ -4177,12 +4229,12 @@
         <p:spPr>
           <a:xfrm>
             <a:off x="5741601" y="4432064"/>
-            <a:ext cx="1457769" cy="384171"/>
+            <a:ext cx="1072447" cy="384171"/>
           </a:xfrm>
           <a:prstGeom prst="rect">
             <a:avLst/>
           </a:prstGeom>
-          <a:ln/>
+          <a:ln w="1270"/>
         </p:spPr>
         <p:style>
           <a:lnRef idx="2">
@@ -4202,20 +4254,24 @@
           <a:bodyPr/>
           <a:lstStyle/>
           <a:p>
-            <a:pPr algn="ctr"/>
-            <a:r>
-              <a:rPr lang="en-US" altLang="zh-CN" sz="1600" dirty="0" smtClean="0"/>
+            <a:pPr algn="ctr">
+              <a:lnSpc>
+                <a:spcPct val="150000"/>
+              </a:lnSpc>
+            </a:pPr>
+            <a:r>
+              <a:rPr lang="en-US" altLang="zh-CN" sz="1100" dirty="0" smtClean="0"/>
               <a:t>Deep</a:t>
             </a:r>
             <a:r>
-              <a:rPr lang="zh-CN" altLang="en-US" sz="1600" dirty="0" smtClean="0"/>
+              <a:rPr lang="zh-CN" altLang="en-US" sz="1100" dirty="0" smtClean="0"/>
               <a:t> </a:t>
             </a:r>
             <a:r>
-              <a:rPr lang="en-US" altLang="zh-CN" sz="1600" dirty="0" smtClean="0"/>
+              <a:rPr lang="en-US" altLang="zh-CN" sz="1100" dirty="0" smtClean="0"/>
               <a:t>Learning</a:t>
             </a:r>
-            <a:endParaRPr lang="zh-CN" altLang="en-US" sz="1600" dirty="0"/>
+            <a:endParaRPr lang="zh-CN" altLang="en-US" sz="1100" dirty="0"/>
           </a:p>
         </p:txBody>
       </p:sp>
@@ -4276,13 +4332,13 @@
         </p:nvSpPr>
         <p:spPr>
           <a:xfrm>
-            <a:off x="1372262" y="3303482"/>
-            <a:ext cx="802308" cy="384171"/>
+            <a:off x="1488438" y="3303482"/>
+            <a:ext cx="686131" cy="384171"/>
           </a:xfrm>
           <a:prstGeom prst="rect">
             <a:avLst/>
           </a:prstGeom>
-          <a:ln/>
+          <a:ln w="3810"/>
         </p:spPr>
         <p:style>
           <a:lnRef idx="2">
@@ -4302,12 +4358,16 @@
           <a:bodyPr/>
           <a:lstStyle/>
           <a:p>
-            <a:pPr algn="ctr"/>
-            <a:r>
-              <a:rPr lang="en-US" altLang="zh-CN" dirty="0" smtClean="0"/>
+            <a:pPr algn="ctr">
+              <a:lnSpc>
+                <a:spcPct val="150000"/>
+              </a:lnSpc>
+            </a:pPr>
+            <a:r>
+              <a:rPr lang="en-US" altLang="zh-CN" sz="1100" dirty="0" smtClean="0"/>
               <a:t>Input</a:t>
             </a:r>
-            <a:endParaRPr lang="zh-CN" altLang="en-US" dirty="0"/>
+            <a:endParaRPr lang="zh-CN" altLang="en-US" sz="1100" dirty="0"/>
           </a:p>
         </p:txBody>
       </p:sp>
@@ -4320,12 +4380,12 @@
         <p:spPr>
           <a:xfrm>
             <a:off x="2425915" y="2704879"/>
-            <a:ext cx="906004" cy="384171"/>
+            <a:ext cx="673862" cy="384171"/>
           </a:xfrm>
           <a:prstGeom prst="rect">
             <a:avLst/>
           </a:prstGeom>
-          <a:ln/>
+          <a:ln w="3810"/>
         </p:spPr>
         <p:style>
           <a:lnRef idx="2">
@@ -4345,20 +4405,24 @@
           <a:bodyPr/>
           <a:lstStyle/>
           <a:p>
-            <a:pPr algn="ctr"/>
-            <a:r>
-              <a:rPr lang="en-US" altLang="zh-CN" dirty="0" smtClean="0"/>
+            <a:pPr algn="ctr">
+              <a:lnSpc>
+                <a:spcPct val="150000"/>
+              </a:lnSpc>
+            </a:pPr>
+            <a:r>
+              <a:rPr lang="en-US" altLang="zh-CN" sz="1100" dirty="0" smtClean="0"/>
               <a:t>Filter</a:t>
             </a:r>
             <a:r>
-              <a:rPr lang="zh-CN" altLang="en-US" dirty="0" smtClean="0"/>
+              <a:rPr lang="zh-CN" altLang="en-US" sz="1100" dirty="0" smtClean="0"/>
               <a:t> </a:t>
             </a:r>
             <a:r>
-              <a:rPr lang="en-US" altLang="zh-CN" dirty="0" smtClean="0"/>
+              <a:rPr lang="en-US" altLang="zh-CN" sz="1100" dirty="0" smtClean="0"/>
               <a:t>1</a:t>
             </a:r>
-            <a:endParaRPr lang="zh-CN" altLang="en-US" dirty="0"/>
+            <a:endParaRPr lang="zh-CN" altLang="en-US" sz="1100" dirty="0"/>
           </a:p>
         </p:txBody>
       </p:sp>
@@ -4371,12 +4435,12 @@
         <p:spPr>
           <a:xfrm>
             <a:off x="2425915" y="4036178"/>
-            <a:ext cx="906004" cy="384171"/>
+            <a:ext cx="673862" cy="384171"/>
           </a:xfrm>
           <a:prstGeom prst="rect">
             <a:avLst/>
           </a:prstGeom>
-          <a:ln/>
+          <a:ln w="3810"/>
         </p:spPr>
         <p:style>
           <a:lnRef idx="2">
@@ -4396,20 +4460,24 @@
           <a:bodyPr/>
           <a:lstStyle/>
           <a:p>
-            <a:pPr algn="ctr"/>
-            <a:r>
-              <a:rPr lang="en-US" altLang="zh-CN" dirty="0" smtClean="0"/>
+            <a:pPr algn="ctr">
+              <a:lnSpc>
+                <a:spcPct val="150000"/>
+              </a:lnSpc>
+            </a:pPr>
+            <a:r>
+              <a:rPr lang="en-US" altLang="zh-CN" sz="1100" dirty="0" smtClean="0"/>
               <a:t>Filter</a:t>
             </a:r>
             <a:r>
-              <a:rPr lang="zh-CN" altLang="en-US" dirty="0" smtClean="0"/>
+              <a:rPr lang="zh-CN" altLang="en-US" sz="1100" dirty="0" smtClean="0"/>
               <a:t> </a:t>
             </a:r>
             <a:r>
-              <a:rPr lang="en-US" altLang="zh-CN" dirty="0" smtClean="0"/>
+              <a:rPr lang="en-US" altLang="zh-CN" sz="1100" dirty="0" smtClean="0"/>
               <a:t>N</a:t>
             </a:r>
-            <a:endParaRPr lang="zh-CN" altLang="en-US" dirty="0"/>
+            <a:endParaRPr lang="zh-CN" altLang="en-US" sz="1100" dirty="0"/>
           </a:p>
         </p:txBody>
       </p:sp>
@@ -4421,13 +4489,16 @@
         </p:nvSpPr>
         <p:spPr>
           <a:xfrm>
-            <a:off x="2676459" y="3089050"/>
-            <a:ext cx="300082" cy="923330"/>
+            <a:off x="2676459" y="3075581"/>
+            <a:ext cx="255198" cy="839974"/>
           </a:xfrm>
           <a:prstGeom prst="rect">
             <a:avLst/>
           </a:prstGeom>
           <a:noFill/>
+          <a:ln w="3810">
+            <a:noFill/>
+          </a:ln>
         </p:spPr>
         <p:txBody>
           <a:bodyPr wrap="none" rtlCol="0">
@@ -4435,25 +4506,40 @@
           </a:bodyPr>
           <a:lstStyle/>
           <a:p>
-            <a:r>
-              <a:rPr kumimoji="1" lang="zh-CN" altLang="zh-CN" dirty="0" smtClean="0"/>
+            <a:pPr algn="ctr">
+              <a:lnSpc>
+                <a:spcPct val="150000"/>
+              </a:lnSpc>
+            </a:pPr>
+            <a:r>
+              <a:rPr kumimoji="1" lang="zh-CN" altLang="zh-CN" sz="1100" dirty="0" smtClean="0"/>
               <a:t>.</a:t>
             </a:r>
-            <a:endParaRPr kumimoji="1" lang="en-US" altLang="zh-CN" dirty="0" smtClean="0"/>
-          </a:p>
-          <a:p>
-            <a:r>
-              <a:rPr kumimoji="1" lang="zh-CN" altLang="zh-CN" dirty="0" smtClean="0"/>
+            <a:endParaRPr kumimoji="1" lang="en-US" altLang="zh-CN" sz="1100" dirty="0" smtClean="0"/>
+          </a:p>
+          <a:p>
+            <a:pPr algn="ctr">
+              <a:lnSpc>
+                <a:spcPct val="150000"/>
+              </a:lnSpc>
+            </a:pPr>
+            <a:r>
+              <a:rPr kumimoji="1" lang="zh-CN" altLang="zh-CN" sz="1100" dirty="0" smtClean="0"/>
               <a:t>.</a:t>
             </a:r>
-            <a:endParaRPr kumimoji="1" lang="en-US" altLang="zh-CN" dirty="0" smtClean="0"/>
-          </a:p>
-          <a:p>
-            <a:r>
-              <a:rPr kumimoji="1" lang="zh-CN" altLang="zh-CN" dirty="0"/>
+            <a:endParaRPr kumimoji="1" lang="en-US" altLang="zh-CN" sz="1100" dirty="0" smtClean="0"/>
+          </a:p>
+          <a:p>
+            <a:pPr algn="ctr">
+              <a:lnSpc>
+                <a:spcPct val="150000"/>
+              </a:lnSpc>
+            </a:pPr>
+            <a:r>
+              <a:rPr kumimoji="1" lang="zh-CN" altLang="zh-CN" sz="1100" dirty="0"/>
               <a:t>.</a:t>
             </a:r>
-            <a:endParaRPr kumimoji="1" lang="zh-CN" altLang="en-US" dirty="0"/>
+            <a:endParaRPr kumimoji="1" lang="zh-CN" altLang="en-US" sz="1100" dirty="0"/>
           </a:p>
         </p:txBody>
       </p:sp>
@@ -4465,13 +4551,13 @@
         </p:nvSpPr>
         <p:spPr>
           <a:xfrm>
-            <a:off x="3616125" y="2704879"/>
-            <a:ext cx="1135955" cy="384171"/>
+            <a:off x="3383983" y="2692502"/>
+            <a:ext cx="780915" cy="384171"/>
           </a:xfrm>
           <a:prstGeom prst="rect">
             <a:avLst/>
           </a:prstGeom>
-          <a:ln/>
+          <a:ln w="3810"/>
         </p:spPr>
         <p:style>
           <a:lnRef idx="2">
@@ -4491,20 +4577,24 @@
           <a:bodyPr/>
           <a:lstStyle/>
           <a:p>
-            <a:pPr algn="ctr"/>
-            <a:r>
-              <a:rPr lang="en-US" altLang="zh-CN" dirty="0" smtClean="0"/>
+            <a:pPr algn="ctr">
+              <a:lnSpc>
+                <a:spcPct val="150000"/>
+              </a:lnSpc>
+            </a:pPr>
+            <a:r>
+              <a:rPr lang="en-US" altLang="zh-CN" sz="1100" dirty="0" smtClean="0"/>
               <a:t>Output</a:t>
             </a:r>
             <a:r>
-              <a:rPr lang="zh-CN" altLang="en-US" dirty="0" smtClean="0"/>
+              <a:rPr lang="zh-CN" altLang="en-US" sz="1100" dirty="0" smtClean="0"/>
               <a:t> </a:t>
             </a:r>
             <a:r>
-              <a:rPr lang="en-US" altLang="zh-CN" dirty="0" smtClean="0"/>
+              <a:rPr lang="en-US" altLang="zh-CN" sz="1100" dirty="0" smtClean="0"/>
               <a:t>1</a:t>
             </a:r>
-            <a:endParaRPr lang="zh-CN" altLang="en-US" dirty="0"/>
+            <a:endParaRPr lang="zh-CN" altLang="en-US" sz="1100" dirty="0"/>
           </a:p>
         </p:txBody>
       </p:sp>
@@ -4516,13 +4606,13 @@
         </p:nvSpPr>
         <p:spPr>
           <a:xfrm>
-            <a:off x="3616125" y="4012380"/>
-            <a:ext cx="1135955" cy="384171"/>
+            <a:off x="3383983" y="4012380"/>
+            <a:ext cx="780915" cy="384171"/>
           </a:xfrm>
           <a:prstGeom prst="rect">
             <a:avLst/>
           </a:prstGeom>
-          <a:ln/>
+          <a:ln w="3810"/>
         </p:spPr>
         <p:style>
           <a:lnRef idx="2">
@@ -4542,20 +4632,24 @@
           <a:bodyPr/>
           <a:lstStyle/>
           <a:p>
-            <a:pPr algn="ctr"/>
-            <a:r>
-              <a:rPr lang="en-US" altLang="zh-CN" dirty="0" smtClean="0"/>
+            <a:pPr algn="ctr">
+              <a:lnSpc>
+                <a:spcPct val="150000"/>
+              </a:lnSpc>
+            </a:pPr>
+            <a:r>
+              <a:rPr lang="en-US" altLang="zh-CN" sz="1100" dirty="0" smtClean="0"/>
               <a:t>Output</a:t>
             </a:r>
             <a:r>
-              <a:rPr lang="zh-CN" altLang="en-US" dirty="0" smtClean="0"/>
+              <a:rPr lang="zh-CN" altLang="en-US" sz="1100" dirty="0" smtClean="0"/>
               <a:t> </a:t>
             </a:r>
             <a:r>
-              <a:rPr lang="en-US" altLang="zh-CN" dirty="0"/>
+              <a:rPr lang="en-US" altLang="zh-CN" sz="1100" dirty="0"/>
               <a:t>N</a:t>
             </a:r>
-            <a:endParaRPr lang="zh-CN" altLang="en-US" dirty="0"/>
+            <a:endParaRPr lang="zh-CN" altLang="en-US" sz="1100" dirty="0"/>
           </a:p>
         </p:txBody>
       </p:sp>
@@ -4570,13 +4664,13 @@
         </p:nvCxnSpPr>
         <p:spPr>
           <a:xfrm flipV="1">
-            <a:off x="2174570" y="2896965"/>
-            <a:ext cx="251345" cy="598603"/>
+            <a:off x="2174569" y="2896965"/>
+            <a:ext cx="251346" cy="598603"/>
           </a:xfrm>
           <a:prstGeom prst="straightConnector1">
             <a:avLst/>
           </a:prstGeom>
-          <a:ln>
+          <a:ln w="3810">
             <a:solidFill>
               <a:schemeClr val="tx1"/>
             </a:solidFill>
@@ -4609,13 +4703,13 @@
         </p:nvCxnSpPr>
         <p:spPr>
           <a:xfrm>
-            <a:off x="2174570" y="3495568"/>
-            <a:ext cx="251345" cy="732696"/>
+            <a:off x="2174569" y="3495568"/>
+            <a:ext cx="251346" cy="732696"/>
           </a:xfrm>
           <a:prstGeom prst="straightConnector1">
             <a:avLst/>
           </a:prstGeom>
-          <a:ln>
+          <a:ln w="3810">
             <a:solidFill>
               <a:schemeClr val="tx1"/>
             </a:solidFill>
@@ -4642,19 +4736,18 @@
           <p:cNvPr id="21" name="直线箭头连接符 20"/>
           <p:cNvCxnSpPr>
             <a:stCxn id="10" idx="3"/>
-            <a:endCxn id="13" idx="1"/>
           </p:cNvCxnSpPr>
           <p:nvPr/>
         </p:nvCxnSpPr>
         <p:spPr>
           <a:xfrm>
-            <a:off x="3331919" y="2896965"/>
+            <a:off x="3099777" y="2896965"/>
             <a:ext cx="284206" cy="0"/>
           </a:xfrm>
           <a:prstGeom prst="straightConnector1">
             <a:avLst/>
           </a:prstGeom>
-          <a:ln>
+          <a:ln w="3810">
             <a:solidFill>
               <a:schemeClr val="tx1"/>
             </a:solidFill>
@@ -4684,13 +4777,13 @@
         </p:nvCxnSpPr>
         <p:spPr>
           <a:xfrm>
-            <a:off x="3342216" y="4228264"/>
+            <a:off x="3099777" y="4228264"/>
             <a:ext cx="284206" cy="0"/>
           </a:xfrm>
           <a:prstGeom prst="straightConnector1">
             <a:avLst/>
           </a:prstGeom>
-          <a:ln>
+          <a:ln w="3810">
             <a:solidFill>
               <a:schemeClr val="tx1"/>
             </a:solidFill>
@@ -4720,13 +4813,13 @@
         </p:nvSpPr>
         <p:spPr>
           <a:xfrm>
-            <a:off x="5256965" y="3303482"/>
-            <a:ext cx="983555" cy="384171"/>
+            <a:off x="4669784" y="3310649"/>
+            <a:ext cx="642170" cy="384171"/>
           </a:xfrm>
           <a:prstGeom prst="rect">
             <a:avLst/>
           </a:prstGeom>
-          <a:ln/>
+          <a:ln w="3810"/>
         </p:spPr>
         <p:style>
           <a:lnRef idx="2">
@@ -4746,32 +4839,34 @@
           <a:bodyPr/>
           <a:lstStyle/>
           <a:p>
-            <a:pPr algn="ctr"/>
-            <a:r>
-              <a:rPr lang="en-US" altLang="zh-CN" dirty="0" smtClean="0"/>
+            <a:pPr algn="ctr">
+              <a:lnSpc>
+                <a:spcPct val="150000"/>
+              </a:lnSpc>
+            </a:pPr>
+            <a:r>
+              <a:rPr lang="en-US" altLang="zh-CN" sz="1100" dirty="0" smtClean="0"/>
               <a:t>Splice</a:t>
             </a:r>
-            <a:endParaRPr lang="zh-CN" altLang="en-US" dirty="0"/>
+            <a:endParaRPr lang="zh-CN" altLang="en-US" sz="1100" dirty="0"/>
           </a:p>
         </p:txBody>
       </p:sp>
       <p:cxnSp>
         <p:nvCxnSpPr>
           <p:cNvPr id="26" name="直线箭头连接符 25"/>
-          <p:cNvCxnSpPr>
-            <a:endCxn id="25" idx="1"/>
-          </p:cNvCxnSpPr>
+          <p:cNvCxnSpPr/>
           <p:nvPr/>
         </p:nvCxnSpPr>
         <p:spPr>
           <a:xfrm>
-            <a:off x="4752080" y="2896965"/>
-            <a:ext cx="504885" cy="598603"/>
+            <a:off x="4164898" y="2872777"/>
+            <a:ext cx="504886" cy="598603"/>
           </a:xfrm>
           <a:prstGeom prst="straightConnector1">
             <a:avLst/>
           </a:prstGeom>
-          <a:ln>
+          <a:ln w="3810">
             <a:solidFill>
               <a:schemeClr val="tx1"/>
             </a:solidFill>
@@ -4804,13 +4899,13 @@
         </p:nvCxnSpPr>
         <p:spPr>
           <a:xfrm flipV="1">
-            <a:off x="4752080" y="3495568"/>
-            <a:ext cx="504885" cy="708898"/>
+            <a:off x="4164898" y="3502735"/>
+            <a:ext cx="504886" cy="701731"/>
           </a:xfrm>
           <a:prstGeom prst="straightConnector1">
             <a:avLst/>
           </a:prstGeom>
-          <a:ln>
+          <a:ln w="3810">
             <a:solidFill>
               <a:schemeClr val="tx1"/>
             </a:solidFill>
@@ -4840,13 +4935,13 @@
         </p:nvSpPr>
         <p:spPr>
           <a:xfrm>
-            <a:off x="6540576" y="3303482"/>
-            <a:ext cx="915278" cy="384171"/>
+            <a:off x="5596160" y="3310649"/>
+            <a:ext cx="601200" cy="384171"/>
           </a:xfrm>
           <a:prstGeom prst="rect">
             <a:avLst/>
           </a:prstGeom>
-          <a:ln/>
+          <a:ln w="3810"/>
         </p:spPr>
         <p:style>
           <a:lnRef idx="2">
@@ -4866,16 +4961,16 @@
           <a:bodyPr/>
           <a:lstStyle/>
           <a:p>
-            <a:pPr algn="ctr"/>
-            <a:r>
-              <a:rPr lang="en-US" altLang="zh-CN" dirty="0" smtClean="0"/>
-              <a:t>P</a:t>
-            </a:r>
-            <a:r>
-              <a:rPr lang="en-US" altLang="zh-CN" dirty="0" smtClean="0"/>
-              <a:t>ooling</a:t>
-            </a:r>
-            <a:endParaRPr lang="zh-CN" altLang="en-US" dirty="0"/>
+            <a:pPr algn="ctr">
+              <a:lnSpc>
+                <a:spcPct val="150000"/>
+              </a:lnSpc>
+            </a:pPr>
+            <a:r>
+              <a:rPr lang="en-US" altLang="zh-CN" sz="1100" dirty="0" smtClean="0"/>
+              <a:t>Pooling</a:t>
+            </a:r>
+            <a:endParaRPr lang="zh-CN" altLang="en-US" sz="1100" dirty="0"/>
           </a:p>
         </p:txBody>
       </p:sp>
@@ -4887,13 +4982,13 @@
         </p:nvCxnSpPr>
         <p:spPr>
           <a:xfrm>
-            <a:off x="6242715" y="3495568"/>
+            <a:off x="5311954" y="3495570"/>
             <a:ext cx="284206" cy="0"/>
           </a:xfrm>
           <a:prstGeom prst="straightConnector1">
             <a:avLst/>
           </a:prstGeom>
-          <a:ln>
+          <a:ln w="3810">
             <a:solidFill>
               <a:schemeClr val="tx1"/>
             </a:solidFill>
@@ -4923,8 +5018,8 @@
         </p:nvSpPr>
         <p:spPr>
           <a:xfrm>
-            <a:off x="6379269" y="3102705"/>
-            <a:ext cx="1213139" cy="816154"/>
+            <a:off x="5434853" y="3109872"/>
+            <a:ext cx="901255" cy="816154"/>
           </a:xfrm>
           <a:prstGeom prst="frame">
             <a:avLst>
@@ -4936,7 +5031,7 @@
               <a:alpha val="75000"/>
             </a:schemeClr>
           </a:solidFill>
-          <a:ln w="6350" cmpd="sng">
+          <a:ln w="3810" cmpd="sng">
             <a:solidFill>
               <a:schemeClr val="tx1"/>
             </a:solidFill>
@@ -4961,8 +5056,12 @@
           <a:bodyPr rtlCol="0" anchor="ctr"/>
           <a:lstStyle/>
           <a:p>
-            <a:pPr algn="ctr"/>
-            <a:endParaRPr kumimoji="1" lang="zh-CN" altLang="en-US">
+            <a:pPr algn="ctr">
+              <a:lnSpc>
+                <a:spcPct val="150000"/>
+              </a:lnSpc>
+            </a:pPr>
+            <a:endParaRPr kumimoji="1" lang="zh-CN" altLang="en-US" sz="1100">
               <a:solidFill>
                 <a:schemeClr val="tx1"/>
               </a:solidFill>
@@ -4978,13 +5077,13 @@
         </p:nvCxnSpPr>
         <p:spPr>
           <a:xfrm>
-            <a:off x="7469513" y="3495568"/>
+            <a:off x="6213581" y="3502735"/>
             <a:ext cx="284206" cy="0"/>
           </a:xfrm>
           <a:prstGeom prst="straightConnector1">
             <a:avLst/>
           </a:prstGeom>
-          <a:ln>
+          <a:ln w="3810">
             <a:solidFill>
               <a:schemeClr val="tx1"/>
             </a:solidFill>
@@ -5010,6 +5109,1904 @@
     <p:extLst>
       <p:ext uri="{BB962C8B-B14F-4D97-AF65-F5344CB8AC3E}">
         <p14:creationId xmlns:p14="http://schemas.microsoft.com/office/powerpoint/2010/main" val="3094262988"/>
+      </p:ext>
+    </p:extLst>
+  </p:cSld>
+  <p:clrMapOvr>
+    <a:masterClrMapping/>
+  </p:clrMapOvr>
+</p:sld>
+</file>
+
+<file path=ppt/slides/slide4.xml><?xml version="1.0" encoding="utf-8"?>
+<p:sld xmlns:a="http://schemas.openxmlformats.org/drawingml/2006/main" xmlns:r="http://schemas.openxmlformats.org/officeDocument/2006/relationships" xmlns:p="http://schemas.openxmlformats.org/presentationml/2006/main">
+  <p:cSld>
+    <p:spTree>
+      <p:nvGrpSpPr>
+        <p:cNvPr id="1" name=""/>
+        <p:cNvGrpSpPr/>
+        <p:nvPr/>
+      </p:nvGrpSpPr>
+      <p:grpSpPr>
+        <a:xfrm>
+          <a:off x="0" y="0"/>
+          <a:ext cx="0" cy="0"/>
+          <a:chOff x="0" y="0"/>
+          <a:chExt cx="0" cy="0"/>
+        </a:xfrm>
+      </p:grpSpPr>
+      <p:sp>
+        <p:nvSpPr>
+          <p:cNvPr id="2" name="标题 1"/>
+          <p:cNvSpPr>
+            <a:spLocks noGrp="1"/>
+          </p:cNvSpPr>
+          <p:nvPr>
+            <p:ph type="title"/>
+          </p:nvPr>
+        </p:nvSpPr>
+        <p:spPr/>
+        <p:txBody>
+          <a:bodyPr/>
+          <a:lstStyle/>
+          <a:p>
+            <a:endParaRPr kumimoji="1" lang="zh-CN" altLang="en-US"/>
+          </a:p>
+        </p:txBody>
+      </p:sp>
+      <p:sp>
+        <p:nvSpPr>
+          <p:cNvPr id="10" name="椭圆 9"/>
+          <p:cNvSpPr/>
+          <p:nvPr/>
+        </p:nvSpPr>
+        <p:spPr>
+          <a:xfrm>
+            <a:off x="1884440" y="3013029"/>
+            <a:ext cx="396006" cy="341364"/>
+          </a:xfrm>
+          <a:prstGeom prst="ellipse">
+            <a:avLst/>
+          </a:prstGeom>
+          <a:noFill/>
+          <a:ln>
+            <a:solidFill>
+              <a:schemeClr val="tx1"/>
+            </a:solidFill>
+          </a:ln>
+        </p:spPr>
+        <p:style>
+          <a:lnRef idx="1">
+            <a:schemeClr val="accent1"/>
+          </a:lnRef>
+          <a:fillRef idx="3">
+            <a:schemeClr val="accent1"/>
+          </a:fillRef>
+          <a:effectRef idx="2">
+            <a:schemeClr val="accent1"/>
+          </a:effectRef>
+          <a:fontRef idx="minor">
+            <a:schemeClr val="lt1"/>
+          </a:fontRef>
+        </p:style>
+        <p:txBody>
+          <a:bodyPr rtlCol="0" anchor="ctr"/>
+          <a:lstStyle/>
+          <a:p>
+            <a:pPr algn="ctr"/>
+            <a:endParaRPr kumimoji="1" lang="zh-CN" altLang="en-US"/>
+          </a:p>
+        </p:txBody>
+      </p:sp>
+      <p:sp>
+        <p:nvSpPr>
+          <p:cNvPr id="12" name="椭圆 11"/>
+          <p:cNvSpPr/>
+          <p:nvPr/>
+        </p:nvSpPr>
+        <p:spPr>
+          <a:xfrm>
+            <a:off x="1884440" y="3349764"/>
+            <a:ext cx="396006" cy="341364"/>
+          </a:xfrm>
+          <a:prstGeom prst="ellipse">
+            <a:avLst/>
+          </a:prstGeom>
+          <a:noFill/>
+          <a:ln>
+            <a:solidFill>
+              <a:schemeClr val="tx1"/>
+            </a:solidFill>
+          </a:ln>
+        </p:spPr>
+        <p:style>
+          <a:lnRef idx="1">
+            <a:schemeClr val="accent1"/>
+          </a:lnRef>
+          <a:fillRef idx="3">
+            <a:schemeClr val="accent1"/>
+          </a:fillRef>
+          <a:effectRef idx="2">
+            <a:schemeClr val="accent1"/>
+          </a:effectRef>
+          <a:fontRef idx="minor">
+            <a:schemeClr val="lt1"/>
+          </a:fontRef>
+        </p:style>
+        <p:txBody>
+          <a:bodyPr rtlCol="0" anchor="ctr"/>
+          <a:lstStyle/>
+          <a:p>
+            <a:pPr algn="ctr"/>
+            <a:endParaRPr kumimoji="1" lang="zh-CN" altLang="en-US"/>
+          </a:p>
+        </p:txBody>
+      </p:sp>
+      <p:sp>
+        <p:nvSpPr>
+          <p:cNvPr id="13" name="椭圆 12"/>
+          <p:cNvSpPr/>
+          <p:nvPr/>
+        </p:nvSpPr>
+        <p:spPr>
+          <a:xfrm>
+            <a:off x="1884440" y="3695523"/>
+            <a:ext cx="396006" cy="341364"/>
+          </a:xfrm>
+          <a:prstGeom prst="ellipse">
+            <a:avLst/>
+          </a:prstGeom>
+          <a:noFill/>
+          <a:ln>
+            <a:solidFill>
+              <a:schemeClr val="tx1"/>
+            </a:solidFill>
+          </a:ln>
+        </p:spPr>
+        <p:style>
+          <a:lnRef idx="1">
+            <a:schemeClr val="accent1"/>
+          </a:lnRef>
+          <a:fillRef idx="3">
+            <a:schemeClr val="accent1"/>
+          </a:fillRef>
+          <a:effectRef idx="2">
+            <a:schemeClr val="accent1"/>
+          </a:effectRef>
+          <a:fontRef idx="minor">
+            <a:schemeClr val="lt1"/>
+          </a:fontRef>
+        </p:style>
+        <p:txBody>
+          <a:bodyPr rtlCol="0" anchor="ctr"/>
+          <a:lstStyle/>
+          <a:p>
+            <a:pPr algn="ctr"/>
+            <a:endParaRPr kumimoji="1" lang="zh-CN" altLang="en-US"/>
+          </a:p>
+        </p:txBody>
+      </p:sp>
+      <p:sp>
+        <p:nvSpPr>
+          <p:cNvPr id="15" name="椭圆 14"/>
+          <p:cNvSpPr/>
+          <p:nvPr/>
+        </p:nvSpPr>
+        <p:spPr>
+          <a:xfrm>
+            <a:off x="1884440" y="4036887"/>
+            <a:ext cx="396006" cy="341364"/>
+          </a:xfrm>
+          <a:prstGeom prst="ellipse">
+            <a:avLst/>
+          </a:prstGeom>
+          <a:noFill/>
+          <a:ln>
+            <a:solidFill>
+              <a:schemeClr val="tx1"/>
+            </a:solidFill>
+          </a:ln>
+        </p:spPr>
+        <p:style>
+          <a:lnRef idx="1">
+            <a:schemeClr val="accent1"/>
+          </a:lnRef>
+          <a:fillRef idx="3">
+            <a:schemeClr val="accent1"/>
+          </a:fillRef>
+          <a:effectRef idx="2">
+            <a:schemeClr val="accent1"/>
+          </a:effectRef>
+          <a:fontRef idx="minor">
+            <a:schemeClr val="lt1"/>
+          </a:fontRef>
+        </p:style>
+        <p:txBody>
+          <a:bodyPr rtlCol="0" anchor="ctr"/>
+          <a:lstStyle/>
+          <a:p>
+            <a:pPr algn="ctr"/>
+            <a:endParaRPr kumimoji="1" lang="zh-CN" altLang="en-US"/>
+          </a:p>
+        </p:txBody>
+      </p:sp>
+      <p:sp>
+        <p:nvSpPr>
+          <p:cNvPr id="16" name="椭圆 15"/>
+          <p:cNvSpPr/>
+          <p:nvPr/>
+        </p:nvSpPr>
+        <p:spPr>
+          <a:xfrm>
+            <a:off x="1884440" y="4362636"/>
+            <a:ext cx="396006" cy="341364"/>
+          </a:xfrm>
+          <a:prstGeom prst="ellipse">
+            <a:avLst/>
+          </a:prstGeom>
+          <a:noFill/>
+          <a:ln>
+            <a:solidFill>
+              <a:schemeClr val="tx1"/>
+            </a:solidFill>
+          </a:ln>
+        </p:spPr>
+        <p:style>
+          <a:lnRef idx="1">
+            <a:schemeClr val="accent1"/>
+          </a:lnRef>
+          <a:fillRef idx="3">
+            <a:schemeClr val="accent1"/>
+          </a:fillRef>
+          <a:effectRef idx="2">
+            <a:schemeClr val="accent1"/>
+          </a:effectRef>
+          <a:fontRef idx="minor">
+            <a:schemeClr val="lt1"/>
+          </a:fontRef>
+        </p:style>
+        <p:txBody>
+          <a:bodyPr rtlCol="0" anchor="ctr"/>
+          <a:lstStyle/>
+          <a:p>
+            <a:pPr algn="ctr"/>
+            <a:endParaRPr kumimoji="1" lang="zh-CN" altLang="en-US"/>
+          </a:p>
+        </p:txBody>
+      </p:sp>
+      <p:sp>
+        <p:nvSpPr>
+          <p:cNvPr id="17" name="椭圆 16"/>
+          <p:cNvSpPr/>
+          <p:nvPr/>
+        </p:nvSpPr>
+        <p:spPr>
+          <a:xfrm>
+            <a:off x="1884440" y="4699371"/>
+            <a:ext cx="396006" cy="341364"/>
+          </a:xfrm>
+          <a:prstGeom prst="ellipse">
+            <a:avLst/>
+          </a:prstGeom>
+          <a:noFill/>
+          <a:ln>
+            <a:solidFill>
+              <a:schemeClr val="tx1"/>
+            </a:solidFill>
+          </a:ln>
+        </p:spPr>
+        <p:style>
+          <a:lnRef idx="1">
+            <a:schemeClr val="accent1"/>
+          </a:lnRef>
+          <a:fillRef idx="3">
+            <a:schemeClr val="accent1"/>
+          </a:fillRef>
+          <a:effectRef idx="2">
+            <a:schemeClr val="accent1"/>
+          </a:effectRef>
+          <a:fontRef idx="minor">
+            <a:schemeClr val="lt1"/>
+          </a:fontRef>
+        </p:style>
+        <p:txBody>
+          <a:bodyPr rtlCol="0" anchor="ctr"/>
+          <a:lstStyle/>
+          <a:p>
+            <a:pPr algn="ctr"/>
+            <a:endParaRPr kumimoji="1" lang="zh-CN" altLang="en-US"/>
+          </a:p>
+        </p:txBody>
+      </p:sp>
+      <p:sp>
+        <p:nvSpPr>
+          <p:cNvPr id="18" name="椭圆 17"/>
+          <p:cNvSpPr/>
+          <p:nvPr/>
+        </p:nvSpPr>
+        <p:spPr>
+          <a:xfrm>
+            <a:off x="1884440" y="5045130"/>
+            <a:ext cx="396006" cy="341364"/>
+          </a:xfrm>
+          <a:prstGeom prst="ellipse">
+            <a:avLst/>
+          </a:prstGeom>
+          <a:noFill/>
+          <a:ln>
+            <a:solidFill>
+              <a:schemeClr val="tx1"/>
+            </a:solidFill>
+          </a:ln>
+        </p:spPr>
+        <p:style>
+          <a:lnRef idx="1">
+            <a:schemeClr val="accent1"/>
+          </a:lnRef>
+          <a:fillRef idx="3">
+            <a:schemeClr val="accent1"/>
+          </a:fillRef>
+          <a:effectRef idx="2">
+            <a:schemeClr val="accent1"/>
+          </a:effectRef>
+          <a:fontRef idx="minor">
+            <a:schemeClr val="lt1"/>
+          </a:fontRef>
+        </p:style>
+        <p:txBody>
+          <a:bodyPr rtlCol="0" anchor="ctr"/>
+          <a:lstStyle/>
+          <a:p>
+            <a:pPr algn="ctr"/>
+            <a:endParaRPr kumimoji="1" lang="zh-CN" altLang="en-US"/>
+          </a:p>
+        </p:txBody>
+      </p:sp>
+      <p:sp>
+        <p:nvSpPr>
+          <p:cNvPr id="19" name="椭圆 18"/>
+          <p:cNvSpPr/>
+          <p:nvPr/>
+        </p:nvSpPr>
+        <p:spPr>
+          <a:xfrm>
+            <a:off x="1884440" y="5386494"/>
+            <a:ext cx="396006" cy="341364"/>
+          </a:xfrm>
+          <a:prstGeom prst="ellipse">
+            <a:avLst/>
+          </a:prstGeom>
+          <a:noFill/>
+          <a:ln>
+            <a:solidFill>
+              <a:schemeClr val="tx1"/>
+            </a:solidFill>
+          </a:ln>
+        </p:spPr>
+        <p:style>
+          <a:lnRef idx="1">
+            <a:schemeClr val="accent1"/>
+          </a:lnRef>
+          <a:fillRef idx="3">
+            <a:schemeClr val="accent1"/>
+          </a:fillRef>
+          <a:effectRef idx="2">
+            <a:schemeClr val="accent1"/>
+          </a:effectRef>
+          <a:fontRef idx="minor">
+            <a:schemeClr val="lt1"/>
+          </a:fontRef>
+        </p:style>
+        <p:txBody>
+          <a:bodyPr rtlCol="0" anchor="ctr"/>
+          <a:lstStyle/>
+          <a:p>
+            <a:pPr algn="ctr"/>
+            <a:endParaRPr kumimoji="1" lang="zh-CN" altLang="en-US"/>
+          </a:p>
+        </p:txBody>
+      </p:sp>
+      <p:sp>
+        <p:nvSpPr>
+          <p:cNvPr id="20" name="椭圆 19"/>
+          <p:cNvSpPr/>
+          <p:nvPr/>
+        </p:nvSpPr>
+        <p:spPr>
+          <a:xfrm>
+            <a:off x="2678650" y="3675513"/>
+            <a:ext cx="396006" cy="341364"/>
+          </a:xfrm>
+          <a:prstGeom prst="ellipse">
+            <a:avLst/>
+          </a:prstGeom>
+          <a:noFill/>
+          <a:ln>
+            <a:solidFill>
+              <a:schemeClr val="tx1"/>
+            </a:solidFill>
+          </a:ln>
+        </p:spPr>
+        <p:style>
+          <a:lnRef idx="1">
+            <a:schemeClr val="accent1"/>
+          </a:lnRef>
+          <a:fillRef idx="3">
+            <a:schemeClr val="accent1"/>
+          </a:fillRef>
+          <a:effectRef idx="2">
+            <a:schemeClr val="accent1"/>
+          </a:effectRef>
+          <a:fontRef idx="minor">
+            <a:schemeClr val="lt1"/>
+          </a:fontRef>
+        </p:style>
+        <p:txBody>
+          <a:bodyPr rtlCol="0" anchor="ctr"/>
+          <a:lstStyle/>
+          <a:p>
+            <a:pPr algn="ctr"/>
+            <a:endParaRPr kumimoji="1" lang="zh-CN" altLang="en-US"/>
+          </a:p>
+        </p:txBody>
+      </p:sp>
+      <p:sp>
+        <p:nvSpPr>
+          <p:cNvPr id="21" name="椭圆 20"/>
+          <p:cNvSpPr/>
+          <p:nvPr/>
+        </p:nvSpPr>
+        <p:spPr>
+          <a:xfrm>
+            <a:off x="2678650" y="4012248"/>
+            <a:ext cx="396006" cy="341364"/>
+          </a:xfrm>
+          <a:prstGeom prst="ellipse">
+            <a:avLst/>
+          </a:prstGeom>
+          <a:noFill/>
+          <a:ln>
+            <a:solidFill>
+              <a:schemeClr val="tx1"/>
+            </a:solidFill>
+          </a:ln>
+        </p:spPr>
+        <p:style>
+          <a:lnRef idx="1">
+            <a:schemeClr val="accent1"/>
+          </a:lnRef>
+          <a:fillRef idx="3">
+            <a:schemeClr val="accent1"/>
+          </a:fillRef>
+          <a:effectRef idx="2">
+            <a:schemeClr val="accent1"/>
+          </a:effectRef>
+          <a:fontRef idx="minor">
+            <a:schemeClr val="lt1"/>
+          </a:fontRef>
+        </p:style>
+        <p:txBody>
+          <a:bodyPr rtlCol="0" anchor="ctr"/>
+          <a:lstStyle/>
+          <a:p>
+            <a:pPr algn="ctr"/>
+            <a:endParaRPr kumimoji="1" lang="zh-CN" altLang="en-US"/>
+          </a:p>
+        </p:txBody>
+      </p:sp>
+      <p:sp>
+        <p:nvSpPr>
+          <p:cNvPr id="22" name="椭圆 21"/>
+          <p:cNvSpPr/>
+          <p:nvPr/>
+        </p:nvSpPr>
+        <p:spPr>
+          <a:xfrm>
+            <a:off x="2678650" y="4358007"/>
+            <a:ext cx="396006" cy="341364"/>
+          </a:xfrm>
+          <a:prstGeom prst="ellipse">
+            <a:avLst/>
+          </a:prstGeom>
+          <a:noFill/>
+          <a:ln>
+            <a:solidFill>
+              <a:schemeClr val="tx1"/>
+            </a:solidFill>
+          </a:ln>
+        </p:spPr>
+        <p:style>
+          <a:lnRef idx="1">
+            <a:schemeClr val="accent1"/>
+          </a:lnRef>
+          <a:fillRef idx="3">
+            <a:schemeClr val="accent1"/>
+          </a:fillRef>
+          <a:effectRef idx="2">
+            <a:schemeClr val="accent1"/>
+          </a:effectRef>
+          <a:fontRef idx="minor">
+            <a:schemeClr val="lt1"/>
+          </a:fontRef>
+        </p:style>
+        <p:txBody>
+          <a:bodyPr rtlCol="0" anchor="ctr"/>
+          <a:lstStyle/>
+          <a:p>
+            <a:pPr algn="ctr"/>
+            <a:endParaRPr kumimoji="1" lang="zh-CN" altLang="en-US"/>
+          </a:p>
+        </p:txBody>
+      </p:sp>
+      <p:sp>
+        <p:nvSpPr>
+          <p:cNvPr id="23" name="椭圆 22"/>
+          <p:cNvSpPr/>
+          <p:nvPr/>
+        </p:nvSpPr>
+        <p:spPr>
+          <a:xfrm>
+            <a:off x="2678650" y="4699371"/>
+            <a:ext cx="396006" cy="341364"/>
+          </a:xfrm>
+          <a:prstGeom prst="ellipse">
+            <a:avLst/>
+          </a:prstGeom>
+          <a:noFill/>
+          <a:ln>
+            <a:solidFill>
+              <a:schemeClr val="tx1"/>
+            </a:solidFill>
+          </a:ln>
+        </p:spPr>
+        <p:style>
+          <a:lnRef idx="1">
+            <a:schemeClr val="accent1"/>
+          </a:lnRef>
+          <a:fillRef idx="3">
+            <a:schemeClr val="accent1"/>
+          </a:fillRef>
+          <a:effectRef idx="2">
+            <a:schemeClr val="accent1"/>
+          </a:effectRef>
+          <a:fontRef idx="minor">
+            <a:schemeClr val="lt1"/>
+          </a:fontRef>
+        </p:style>
+        <p:txBody>
+          <a:bodyPr rtlCol="0" anchor="ctr"/>
+          <a:lstStyle/>
+          <a:p>
+            <a:pPr algn="ctr"/>
+            <a:endParaRPr kumimoji="1" lang="zh-CN" altLang="en-US"/>
+          </a:p>
+        </p:txBody>
+      </p:sp>
+      <p:sp>
+        <p:nvSpPr>
+          <p:cNvPr id="24" name="椭圆 23"/>
+          <p:cNvSpPr/>
+          <p:nvPr/>
+        </p:nvSpPr>
+        <p:spPr>
+          <a:xfrm>
+            <a:off x="4204143" y="3675513"/>
+            <a:ext cx="396006" cy="341364"/>
+          </a:xfrm>
+          <a:prstGeom prst="ellipse">
+            <a:avLst/>
+          </a:prstGeom>
+          <a:noFill/>
+          <a:ln>
+            <a:solidFill>
+              <a:schemeClr val="tx1"/>
+            </a:solidFill>
+          </a:ln>
+        </p:spPr>
+        <p:style>
+          <a:lnRef idx="1">
+            <a:schemeClr val="accent1"/>
+          </a:lnRef>
+          <a:fillRef idx="3">
+            <a:schemeClr val="accent1"/>
+          </a:fillRef>
+          <a:effectRef idx="2">
+            <a:schemeClr val="accent1"/>
+          </a:effectRef>
+          <a:fontRef idx="minor">
+            <a:schemeClr val="lt1"/>
+          </a:fontRef>
+        </p:style>
+        <p:txBody>
+          <a:bodyPr rtlCol="0" anchor="ctr"/>
+          <a:lstStyle/>
+          <a:p>
+            <a:pPr algn="ctr"/>
+            <a:endParaRPr kumimoji="1" lang="zh-CN" altLang="en-US"/>
+          </a:p>
+        </p:txBody>
+      </p:sp>
+      <p:sp>
+        <p:nvSpPr>
+          <p:cNvPr id="25" name="椭圆 24"/>
+          <p:cNvSpPr/>
+          <p:nvPr/>
+        </p:nvSpPr>
+        <p:spPr>
+          <a:xfrm>
+            <a:off x="4204143" y="4012248"/>
+            <a:ext cx="396006" cy="341364"/>
+          </a:xfrm>
+          <a:prstGeom prst="ellipse">
+            <a:avLst/>
+          </a:prstGeom>
+          <a:noFill/>
+          <a:ln>
+            <a:solidFill>
+              <a:schemeClr val="tx1"/>
+            </a:solidFill>
+          </a:ln>
+        </p:spPr>
+        <p:style>
+          <a:lnRef idx="1">
+            <a:schemeClr val="accent1"/>
+          </a:lnRef>
+          <a:fillRef idx="3">
+            <a:schemeClr val="accent1"/>
+          </a:fillRef>
+          <a:effectRef idx="2">
+            <a:schemeClr val="accent1"/>
+          </a:effectRef>
+          <a:fontRef idx="minor">
+            <a:schemeClr val="lt1"/>
+          </a:fontRef>
+        </p:style>
+        <p:txBody>
+          <a:bodyPr rtlCol="0" anchor="ctr"/>
+          <a:lstStyle/>
+          <a:p>
+            <a:pPr algn="ctr"/>
+            <a:endParaRPr kumimoji="1" lang="zh-CN" altLang="en-US"/>
+          </a:p>
+        </p:txBody>
+      </p:sp>
+      <p:sp>
+        <p:nvSpPr>
+          <p:cNvPr id="26" name="椭圆 25"/>
+          <p:cNvSpPr/>
+          <p:nvPr/>
+        </p:nvSpPr>
+        <p:spPr>
+          <a:xfrm>
+            <a:off x="4204143" y="4358007"/>
+            <a:ext cx="396006" cy="341364"/>
+          </a:xfrm>
+          <a:prstGeom prst="ellipse">
+            <a:avLst/>
+          </a:prstGeom>
+          <a:noFill/>
+          <a:ln>
+            <a:solidFill>
+              <a:schemeClr val="tx1"/>
+            </a:solidFill>
+          </a:ln>
+        </p:spPr>
+        <p:style>
+          <a:lnRef idx="1">
+            <a:schemeClr val="accent1"/>
+          </a:lnRef>
+          <a:fillRef idx="3">
+            <a:schemeClr val="accent1"/>
+          </a:fillRef>
+          <a:effectRef idx="2">
+            <a:schemeClr val="accent1"/>
+          </a:effectRef>
+          <a:fontRef idx="minor">
+            <a:schemeClr val="lt1"/>
+          </a:fontRef>
+        </p:style>
+        <p:txBody>
+          <a:bodyPr rtlCol="0" anchor="ctr"/>
+          <a:lstStyle/>
+          <a:p>
+            <a:pPr algn="ctr"/>
+            <a:endParaRPr kumimoji="1" lang="zh-CN" altLang="en-US"/>
+          </a:p>
+        </p:txBody>
+      </p:sp>
+      <p:sp>
+        <p:nvSpPr>
+          <p:cNvPr id="27" name="椭圆 26"/>
+          <p:cNvSpPr/>
+          <p:nvPr/>
+        </p:nvSpPr>
+        <p:spPr>
+          <a:xfrm>
+            <a:off x="4204143" y="4699371"/>
+            <a:ext cx="396006" cy="341364"/>
+          </a:xfrm>
+          <a:prstGeom prst="ellipse">
+            <a:avLst/>
+          </a:prstGeom>
+          <a:noFill/>
+          <a:ln>
+            <a:solidFill>
+              <a:schemeClr val="tx1"/>
+            </a:solidFill>
+          </a:ln>
+        </p:spPr>
+        <p:style>
+          <a:lnRef idx="1">
+            <a:schemeClr val="accent1"/>
+          </a:lnRef>
+          <a:fillRef idx="3">
+            <a:schemeClr val="accent1"/>
+          </a:fillRef>
+          <a:effectRef idx="2">
+            <a:schemeClr val="accent1"/>
+          </a:effectRef>
+          <a:fontRef idx="minor">
+            <a:schemeClr val="lt1"/>
+          </a:fontRef>
+        </p:style>
+        <p:txBody>
+          <a:bodyPr rtlCol="0" anchor="ctr"/>
+          <a:lstStyle/>
+          <a:p>
+            <a:pPr algn="ctr"/>
+            <a:endParaRPr kumimoji="1" lang="zh-CN" altLang="en-US"/>
+          </a:p>
+        </p:txBody>
+      </p:sp>
+      <p:sp>
+        <p:nvSpPr>
+          <p:cNvPr id="32" name="椭圆 31"/>
+          <p:cNvSpPr/>
+          <p:nvPr/>
+        </p:nvSpPr>
+        <p:spPr>
+          <a:xfrm>
+            <a:off x="5027384" y="3013029"/>
+            <a:ext cx="396006" cy="341364"/>
+          </a:xfrm>
+          <a:prstGeom prst="ellipse">
+            <a:avLst/>
+          </a:prstGeom>
+          <a:noFill/>
+          <a:ln>
+            <a:solidFill>
+              <a:schemeClr val="tx1"/>
+            </a:solidFill>
+          </a:ln>
+        </p:spPr>
+        <p:style>
+          <a:lnRef idx="1">
+            <a:schemeClr val="accent1"/>
+          </a:lnRef>
+          <a:fillRef idx="3">
+            <a:schemeClr val="accent1"/>
+          </a:fillRef>
+          <a:effectRef idx="2">
+            <a:schemeClr val="accent1"/>
+          </a:effectRef>
+          <a:fontRef idx="minor">
+            <a:schemeClr val="lt1"/>
+          </a:fontRef>
+        </p:style>
+        <p:txBody>
+          <a:bodyPr rtlCol="0" anchor="ctr"/>
+          <a:lstStyle/>
+          <a:p>
+            <a:pPr algn="ctr"/>
+            <a:endParaRPr kumimoji="1" lang="zh-CN" altLang="en-US"/>
+          </a:p>
+        </p:txBody>
+      </p:sp>
+      <p:sp>
+        <p:nvSpPr>
+          <p:cNvPr id="33" name="椭圆 32"/>
+          <p:cNvSpPr/>
+          <p:nvPr/>
+        </p:nvSpPr>
+        <p:spPr>
+          <a:xfrm>
+            <a:off x="5027384" y="3349764"/>
+            <a:ext cx="396006" cy="341364"/>
+          </a:xfrm>
+          <a:prstGeom prst="ellipse">
+            <a:avLst/>
+          </a:prstGeom>
+          <a:noFill/>
+          <a:ln>
+            <a:solidFill>
+              <a:schemeClr val="tx1"/>
+            </a:solidFill>
+          </a:ln>
+        </p:spPr>
+        <p:style>
+          <a:lnRef idx="1">
+            <a:schemeClr val="accent1"/>
+          </a:lnRef>
+          <a:fillRef idx="3">
+            <a:schemeClr val="accent1"/>
+          </a:fillRef>
+          <a:effectRef idx="2">
+            <a:schemeClr val="accent1"/>
+          </a:effectRef>
+          <a:fontRef idx="minor">
+            <a:schemeClr val="lt1"/>
+          </a:fontRef>
+        </p:style>
+        <p:txBody>
+          <a:bodyPr rtlCol="0" anchor="ctr"/>
+          <a:lstStyle/>
+          <a:p>
+            <a:pPr algn="ctr"/>
+            <a:endParaRPr kumimoji="1" lang="zh-CN" altLang="en-US"/>
+          </a:p>
+        </p:txBody>
+      </p:sp>
+      <p:sp>
+        <p:nvSpPr>
+          <p:cNvPr id="34" name="椭圆 33"/>
+          <p:cNvSpPr/>
+          <p:nvPr/>
+        </p:nvSpPr>
+        <p:spPr>
+          <a:xfrm>
+            <a:off x="5027384" y="3695523"/>
+            <a:ext cx="396006" cy="341364"/>
+          </a:xfrm>
+          <a:prstGeom prst="ellipse">
+            <a:avLst/>
+          </a:prstGeom>
+          <a:noFill/>
+          <a:ln>
+            <a:solidFill>
+              <a:schemeClr val="tx1"/>
+            </a:solidFill>
+          </a:ln>
+        </p:spPr>
+        <p:style>
+          <a:lnRef idx="1">
+            <a:schemeClr val="accent1"/>
+          </a:lnRef>
+          <a:fillRef idx="3">
+            <a:schemeClr val="accent1"/>
+          </a:fillRef>
+          <a:effectRef idx="2">
+            <a:schemeClr val="accent1"/>
+          </a:effectRef>
+          <a:fontRef idx="minor">
+            <a:schemeClr val="lt1"/>
+          </a:fontRef>
+        </p:style>
+        <p:txBody>
+          <a:bodyPr rtlCol="0" anchor="ctr"/>
+          <a:lstStyle/>
+          <a:p>
+            <a:pPr algn="ctr"/>
+            <a:endParaRPr kumimoji="1" lang="zh-CN" altLang="en-US"/>
+          </a:p>
+        </p:txBody>
+      </p:sp>
+      <p:sp>
+        <p:nvSpPr>
+          <p:cNvPr id="35" name="椭圆 34"/>
+          <p:cNvSpPr/>
+          <p:nvPr/>
+        </p:nvSpPr>
+        <p:spPr>
+          <a:xfrm>
+            <a:off x="5027384" y="4036887"/>
+            <a:ext cx="396006" cy="341364"/>
+          </a:xfrm>
+          <a:prstGeom prst="ellipse">
+            <a:avLst/>
+          </a:prstGeom>
+          <a:noFill/>
+          <a:ln>
+            <a:solidFill>
+              <a:schemeClr val="tx1"/>
+            </a:solidFill>
+          </a:ln>
+        </p:spPr>
+        <p:style>
+          <a:lnRef idx="1">
+            <a:schemeClr val="accent1"/>
+          </a:lnRef>
+          <a:fillRef idx="3">
+            <a:schemeClr val="accent1"/>
+          </a:fillRef>
+          <a:effectRef idx="2">
+            <a:schemeClr val="accent1"/>
+          </a:effectRef>
+          <a:fontRef idx="minor">
+            <a:schemeClr val="lt1"/>
+          </a:fontRef>
+        </p:style>
+        <p:txBody>
+          <a:bodyPr rtlCol="0" anchor="ctr"/>
+          <a:lstStyle/>
+          <a:p>
+            <a:pPr algn="ctr"/>
+            <a:endParaRPr kumimoji="1" lang="zh-CN" altLang="en-US"/>
+          </a:p>
+        </p:txBody>
+      </p:sp>
+      <p:sp>
+        <p:nvSpPr>
+          <p:cNvPr id="36" name="椭圆 35"/>
+          <p:cNvSpPr/>
+          <p:nvPr/>
+        </p:nvSpPr>
+        <p:spPr>
+          <a:xfrm>
+            <a:off x="5027384" y="4362636"/>
+            <a:ext cx="396006" cy="341364"/>
+          </a:xfrm>
+          <a:prstGeom prst="ellipse">
+            <a:avLst/>
+          </a:prstGeom>
+          <a:noFill/>
+          <a:ln>
+            <a:solidFill>
+              <a:schemeClr val="tx1"/>
+            </a:solidFill>
+          </a:ln>
+        </p:spPr>
+        <p:style>
+          <a:lnRef idx="1">
+            <a:schemeClr val="accent1"/>
+          </a:lnRef>
+          <a:fillRef idx="3">
+            <a:schemeClr val="accent1"/>
+          </a:fillRef>
+          <a:effectRef idx="2">
+            <a:schemeClr val="accent1"/>
+          </a:effectRef>
+          <a:fontRef idx="minor">
+            <a:schemeClr val="lt1"/>
+          </a:fontRef>
+        </p:style>
+        <p:txBody>
+          <a:bodyPr rtlCol="0" anchor="ctr"/>
+          <a:lstStyle/>
+          <a:p>
+            <a:pPr algn="ctr"/>
+            <a:endParaRPr kumimoji="1" lang="zh-CN" altLang="en-US"/>
+          </a:p>
+        </p:txBody>
+      </p:sp>
+      <p:sp>
+        <p:nvSpPr>
+          <p:cNvPr id="37" name="椭圆 36"/>
+          <p:cNvSpPr/>
+          <p:nvPr/>
+        </p:nvSpPr>
+        <p:spPr>
+          <a:xfrm>
+            <a:off x="5027384" y="4699371"/>
+            <a:ext cx="396006" cy="341364"/>
+          </a:xfrm>
+          <a:prstGeom prst="ellipse">
+            <a:avLst/>
+          </a:prstGeom>
+          <a:noFill/>
+          <a:ln>
+            <a:solidFill>
+              <a:schemeClr val="tx1"/>
+            </a:solidFill>
+          </a:ln>
+        </p:spPr>
+        <p:style>
+          <a:lnRef idx="1">
+            <a:schemeClr val="accent1"/>
+          </a:lnRef>
+          <a:fillRef idx="3">
+            <a:schemeClr val="accent1"/>
+          </a:fillRef>
+          <a:effectRef idx="2">
+            <a:schemeClr val="accent1"/>
+          </a:effectRef>
+          <a:fontRef idx="minor">
+            <a:schemeClr val="lt1"/>
+          </a:fontRef>
+        </p:style>
+        <p:txBody>
+          <a:bodyPr rtlCol="0" anchor="ctr"/>
+          <a:lstStyle/>
+          <a:p>
+            <a:pPr algn="ctr"/>
+            <a:endParaRPr kumimoji="1" lang="zh-CN" altLang="en-US"/>
+          </a:p>
+        </p:txBody>
+      </p:sp>
+      <p:sp>
+        <p:nvSpPr>
+          <p:cNvPr id="38" name="椭圆 37"/>
+          <p:cNvSpPr/>
+          <p:nvPr/>
+        </p:nvSpPr>
+        <p:spPr>
+          <a:xfrm>
+            <a:off x="5027384" y="5045130"/>
+            <a:ext cx="396006" cy="341364"/>
+          </a:xfrm>
+          <a:prstGeom prst="ellipse">
+            <a:avLst/>
+          </a:prstGeom>
+          <a:noFill/>
+          <a:ln>
+            <a:solidFill>
+              <a:schemeClr val="tx1"/>
+            </a:solidFill>
+          </a:ln>
+        </p:spPr>
+        <p:style>
+          <a:lnRef idx="1">
+            <a:schemeClr val="accent1"/>
+          </a:lnRef>
+          <a:fillRef idx="3">
+            <a:schemeClr val="accent1"/>
+          </a:fillRef>
+          <a:effectRef idx="2">
+            <a:schemeClr val="accent1"/>
+          </a:effectRef>
+          <a:fontRef idx="minor">
+            <a:schemeClr val="lt1"/>
+          </a:fontRef>
+        </p:style>
+        <p:txBody>
+          <a:bodyPr rtlCol="0" anchor="ctr"/>
+          <a:lstStyle/>
+          <a:p>
+            <a:pPr algn="ctr"/>
+            <a:endParaRPr kumimoji="1" lang="zh-CN" altLang="en-US"/>
+          </a:p>
+        </p:txBody>
+      </p:sp>
+      <p:sp>
+        <p:nvSpPr>
+          <p:cNvPr id="39" name="椭圆 38"/>
+          <p:cNvSpPr/>
+          <p:nvPr/>
+        </p:nvSpPr>
+        <p:spPr>
+          <a:xfrm>
+            <a:off x="5027384" y="5386494"/>
+            <a:ext cx="396006" cy="341364"/>
+          </a:xfrm>
+          <a:prstGeom prst="ellipse">
+            <a:avLst/>
+          </a:prstGeom>
+          <a:noFill/>
+          <a:ln>
+            <a:solidFill>
+              <a:schemeClr val="tx1"/>
+            </a:solidFill>
+          </a:ln>
+        </p:spPr>
+        <p:style>
+          <a:lnRef idx="1">
+            <a:schemeClr val="accent1"/>
+          </a:lnRef>
+          <a:fillRef idx="3">
+            <a:schemeClr val="accent1"/>
+          </a:fillRef>
+          <a:effectRef idx="2">
+            <a:schemeClr val="accent1"/>
+          </a:effectRef>
+          <a:fontRef idx="minor">
+            <a:schemeClr val="lt1"/>
+          </a:fontRef>
+        </p:style>
+        <p:txBody>
+          <a:bodyPr rtlCol="0" anchor="ctr"/>
+          <a:lstStyle/>
+          <a:p>
+            <a:pPr algn="ctr"/>
+            <a:endParaRPr kumimoji="1" lang="zh-CN" altLang="en-US"/>
+          </a:p>
+        </p:txBody>
+      </p:sp>
+      <p:sp>
+        <p:nvSpPr>
+          <p:cNvPr id="40" name="椭圆 39"/>
+          <p:cNvSpPr/>
+          <p:nvPr/>
+        </p:nvSpPr>
+        <p:spPr>
+          <a:xfrm>
+            <a:off x="3427975" y="4041291"/>
+            <a:ext cx="396006" cy="341364"/>
+          </a:xfrm>
+          <a:prstGeom prst="ellipse">
+            <a:avLst/>
+          </a:prstGeom>
+          <a:noFill/>
+          <a:ln>
+            <a:solidFill>
+              <a:schemeClr val="tx1"/>
+            </a:solidFill>
+          </a:ln>
+        </p:spPr>
+        <p:style>
+          <a:lnRef idx="1">
+            <a:schemeClr val="accent1"/>
+          </a:lnRef>
+          <a:fillRef idx="3">
+            <a:schemeClr val="accent1"/>
+          </a:fillRef>
+          <a:effectRef idx="2">
+            <a:schemeClr val="accent1"/>
+          </a:effectRef>
+          <a:fontRef idx="minor">
+            <a:schemeClr val="lt1"/>
+          </a:fontRef>
+        </p:style>
+        <p:txBody>
+          <a:bodyPr rtlCol="0" anchor="ctr"/>
+          <a:lstStyle/>
+          <a:p>
+            <a:pPr algn="ctr"/>
+            <a:endParaRPr kumimoji="1" lang="zh-CN" altLang="en-US"/>
+          </a:p>
+        </p:txBody>
+      </p:sp>
+      <p:sp>
+        <p:nvSpPr>
+          <p:cNvPr id="41" name="椭圆 40"/>
+          <p:cNvSpPr/>
+          <p:nvPr/>
+        </p:nvSpPr>
+        <p:spPr>
+          <a:xfrm>
+            <a:off x="3427975" y="4382655"/>
+            <a:ext cx="396006" cy="341364"/>
+          </a:xfrm>
+          <a:prstGeom prst="ellipse">
+            <a:avLst/>
+          </a:prstGeom>
+          <a:noFill/>
+          <a:ln>
+            <a:solidFill>
+              <a:schemeClr val="tx1"/>
+            </a:solidFill>
+          </a:ln>
+        </p:spPr>
+        <p:style>
+          <a:lnRef idx="1">
+            <a:schemeClr val="accent1"/>
+          </a:lnRef>
+          <a:fillRef idx="3">
+            <a:schemeClr val="accent1"/>
+          </a:fillRef>
+          <a:effectRef idx="2">
+            <a:schemeClr val="accent1"/>
+          </a:effectRef>
+          <a:fontRef idx="minor">
+            <a:schemeClr val="lt1"/>
+          </a:fontRef>
+        </p:style>
+        <p:txBody>
+          <a:bodyPr rtlCol="0" anchor="ctr"/>
+          <a:lstStyle/>
+          <a:p>
+            <a:pPr algn="ctr"/>
+            <a:endParaRPr kumimoji="1" lang="zh-CN" altLang="en-US"/>
+          </a:p>
+        </p:txBody>
+      </p:sp>
+      <p:cxnSp>
+        <p:nvCxnSpPr>
+          <p:cNvPr id="47" name="直线箭头连接符 46"/>
+          <p:cNvCxnSpPr>
+            <a:endCxn id="20" idx="1"/>
+          </p:cNvCxnSpPr>
+          <p:nvPr/>
+        </p:nvCxnSpPr>
+        <p:spPr>
+          <a:xfrm>
+            <a:off x="2300242" y="3196267"/>
+            <a:ext cx="436402" cy="529238"/>
+          </a:xfrm>
+          <a:prstGeom prst="straightConnector1">
+            <a:avLst/>
+          </a:prstGeom>
+          <a:ln w="3810">
+            <a:solidFill>
+              <a:schemeClr val="tx1"/>
+            </a:solidFill>
+            <a:tailEnd type="arrow"/>
+          </a:ln>
+        </p:spPr>
+        <p:style>
+          <a:lnRef idx="2">
+            <a:schemeClr val="accent1"/>
+          </a:lnRef>
+          <a:fillRef idx="0">
+            <a:schemeClr val="accent1"/>
+          </a:fillRef>
+          <a:effectRef idx="1">
+            <a:schemeClr val="accent1"/>
+          </a:effectRef>
+          <a:fontRef idx="minor">
+            <a:schemeClr val="tx1"/>
+          </a:fontRef>
+        </p:style>
+      </p:cxnSp>
+      <p:cxnSp>
+        <p:nvCxnSpPr>
+          <p:cNvPr id="49" name="直线箭头连接符 48"/>
+          <p:cNvCxnSpPr>
+            <a:endCxn id="23" idx="3"/>
+          </p:cNvCxnSpPr>
+          <p:nvPr/>
+        </p:nvCxnSpPr>
+        <p:spPr>
+          <a:xfrm flipV="1">
+            <a:off x="2300242" y="4990743"/>
+            <a:ext cx="436402" cy="569962"/>
+          </a:xfrm>
+          <a:prstGeom prst="straightConnector1">
+            <a:avLst/>
+          </a:prstGeom>
+          <a:ln w="3810">
+            <a:solidFill>
+              <a:schemeClr val="tx1"/>
+            </a:solidFill>
+            <a:tailEnd type="arrow"/>
+          </a:ln>
+        </p:spPr>
+        <p:style>
+          <a:lnRef idx="2">
+            <a:schemeClr val="accent1"/>
+          </a:lnRef>
+          <a:fillRef idx="0">
+            <a:schemeClr val="accent1"/>
+          </a:fillRef>
+          <a:effectRef idx="1">
+            <a:schemeClr val="accent1"/>
+          </a:effectRef>
+          <a:fontRef idx="minor">
+            <a:schemeClr val="tx1"/>
+          </a:fontRef>
+        </p:style>
+      </p:cxnSp>
+      <p:cxnSp>
+        <p:nvCxnSpPr>
+          <p:cNvPr id="51" name="直线箭头连接符 50"/>
+          <p:cNvCxnSpPr>
+            <a:stCxn id="20" idx="6"/>
+            <a:endCxn id="40" idx="1"/>
+          </p:cNvCxnSpPr>
+          <p:nvPr/>
+        </p:nvCxnSpPr>
+        <p:spPr>
+          <a:xfrm>
+            <a:off x="3074656" y="3846195"/>
+            <a:ext cx="411313" cy="245088"/>
+          </a:xfrm>
+          <a:prstGeom prst="straightConnector1">
+            <a:avLst/>
+          </a:prstGeom>
+          <a:ln w="3810">
+            <a:solidFill>
+              <a:schemeClr val="tx1"/>
+            </a:solidFill>
+            <a:tailEnd type="arrow"/>
+          </a:ln>
+        </p:spPr>
+        <p:style>
+          <a:lnRef idx="2">
+            <a:schemeClr val="accent1"/>
+          </a:lnRef>
+          <a:fillRef idx="0">
+            <a:schemeClr val="accent1"/>
+          </a:fillRef>
+          <a:effectRef idx="1">
+            <a:schemeClr val="accent1"/>
+          </a:effectRef>
+          <a:fontRef idx="minor">
+            <a:schemeClr val="tx1"/>
+          </a:fontRef>
+        </p:style>
+      </p:cxnSp>
+      <p:cxnSp>
+        <p:nvCxnSpPr>
+          <p:cNvPr id="53" name="直线箭头连接符 52"/>
+          <p:cNvCxnSpPr>
+            <a:stCxn id="23" idx="6"/>
+            <a:endCxn id="41" idx="3"/>
+          </p:cNvCxnSpPr>
+          <p:nvPr/>
+        </p:nvCxnSpPr>
+        <p:spPr>
+          <a:xfrm flipV="1">
+            <a:off x="3074656" y="4674027"/>
+            <a:ext cx="411313" cy="196026"/>
+          </a:xfrm>
+          <a:prstGeom prst="straightConnector1">
+            <a:avLst/>
+          </a:prstGeom>
+          <a:ln w="3810">
+            <a:solidFill>
+              <a:schemeClr val="tx1"/>
+            </a:solidFill>
+            <a:tailEnd type="arrow"/>
+          </a:ln>
+        </p:spPr>
+        <p:style>
+          <a:lnRef idx="2">
+            <a:schemeClr val="accent1"/>
+          </a:lnRef>
+          <a:fillRef idx="0">
+            <a:schemeClr val="accent1"/>
+          </a:fillRef>
+          <a:effectRef idx="1">
+            <a:schemeClr val="accent1"/>
+          </a:effectRef>
+          <a:fontRef idx="minor">
+            <a:schemeClr val="tx1"/>
+          </a:fontRef>
+        </p:style>
+      </p:cxnSp>
+      <p:cxnSp>
+        <p:nvCxnSpPr>
+          <p:cNvPr id="57" name="直线箭头连接符 56"/>
+          <p:cNvCxnSpPr>
+            <a:endCxn id="24" idx="2"/>
+          </p:cNvCxnSpPr>
+          <p:nvPr/>
+        </p:nvCxnSpPr>
+        <p:spPr>
+          <a:xfrm flipV="1">
+            <a:off x="3823981" y="3846195"/>
+            <a:ext cx="380162" cy="323938"/>
+          </a:xfrm>
+          <a:prstGeom prst="straightConnector1">
+            <a:avLst/>
+          </a:prstGeom>
+          <a:ln w="3810">
+            <a:solidFill>
+              <a:schemeClr val="tx1"/>
+            </a:solidFill>
+            <a:tailEnd type="arrow"/>
+          </a:ln>
+        </p:spPr>
+        <p:style>
+          <a:lnRef idx="2">
+            <a:schemeClr val="accent1"/>
+          </a:lnRef>
+          <a:fillRef idx="0">
+            <a:schemeClr val="accent1"/>
+          </a:fillRef>
+          <a:effectRef idx="1">
+            <a:schemeClr val="accent1"/>
+          </a:effectRef>
+          <a:fontRef idx="minor">
+            <a:schemeClr val="tx1"/>
+          </a:fontRef>
+        </p:style>
+      </p:cxnSp>
+      <p:cxnSp>
+        <p:nvCxnSpPr>
+          <p:cNvPr id="59" name="直线箭头连接符 58"/>
+          <p:cNvCxnSpPr>
+            <a:stCxn id="41" idx="6"/>
+            <a:endCxn id="27" idx="2"/>
+          </p:cNvCxnSpPr>
+          <p:nvPr/>
+        </p:nvCxnSpPr>
+        <p:spPr>
+          <a:xfrm>
+            <a:off x="3823981" y="4553337"/>
+            <a:ext cx="380162" cy="316716"/>
+          </a:xfrm>
+          <a:prstGeom prst="straightConnector1">
+            <a:avLst/>
+          </a:prstGeom>
+          <a:ln w="3810">
+            <a:solidFill>
+              <a:schemeClr val="tx1"/>
+            </a:solidFill>
+            <a:tailEnd type="arrow"/>
+          </a:ln>
+        </p:spPr>
+        <p:style>
+          <a:lnRef idx="2">
+            <a:schemeClr val="accent1"/>
+          </a:lnRef>
+          <a:fillRef idx="0">
+            <a:schemeClr val="accent1"/>
+          </a:fillRef>
+          <a:effectRef idx="1">
+            <a:schemeClr val="accent1"/>
+          </a:effectRef>
+          <a:fontRef idx="minor">
+            <a:schemeClr val="tx1"/>
+          </a:fontRef>
+        </p:style>
+      </p:cxnSp>
+      <p:cxnSp>
+        <p:nvCxnSpPr>
+          <p:cNvPr id="62" name="直线箭头连接符 61"/>
+          <p:cNvCxnSpPr>
+            <a:endCxn id="39" idx="2"/>
+          </p:cNvCxnSpPr>
+          <p:nvPr/>
+        </p:nvCxnSpPr>
+        <p:spPr>
+          <a:xfrm>
+            <a:off x="4590982" y="4947591"/>
+            <a:ext cx="436402" cy="609585"/>
+          </a:xfrm>
+          <a:prstGeom prst="straightConnector1">
+            <a:avLst/>
+          </a:prstGeom>
+          <a:ln w="3810">
+            <a:solidFill>
+              <a:schemeClr val="tx1"/>
+            </a:solidFill>
+            <a:tailEnd type="arrow"/>
+          </a:ln>
+        </p:spPr>
+        <p:style>
+          <a:lnRef idx="2">
+            <a:schemeClr val="accent1"/>
+          </a:lnRef>
+          <a:fillRef idx="0">
+            <a:schemeClr val="accent1"/>
+          </a:fillRef>
+          <a:effectRef idx="1">
+            <a:schemeClr val="accent1"/>
+          </a:effectRef>
+          <a:fontRef idx="minor">
+            <a:schemeClr val="tx1"/>
+          </a:fontRef>
+        </p:style>
+      </p:cxnSp>
+      <p:cxnSp>
+        <p:nvCxnSpPr>
+          <p:cNvPr id="64" name="直线箭头连接符 63"/>
+          <p:cNvCxnSpPr>
+            <a:endCxn id="32" idx="2"/>
+          </p:cNvCxnSpPr>
+          <p:nvPr/>
+        </p:nvCxnSpPr>
+        <p:spPr>
+          <a:xfrm flipV="1">
+            <a:off x="4600149" y="3183711"/>
+            <a:ext cx="427235" cy="592961"/>
+          </a:xfrm>
+          <a:prstGeom prst="straightConnector1">
+            <a:avLst/>
+          </a:prstGeom>
+          <a:ln w="3810">
+            <a:solidFill>
+              <a:schemeClr val="tx1"/>
+            </a:solidFill>
+            <a:tailEnd type="arrow"/>
+          </a:ln>
+        </p:spPr>
+        <p:style>
+          <a:lnRef idx="2">
+            <a:schemeClr val="accent1"/>
+          </a:lnRef>
+          <a:fillRef idx="0">
+            <a:schemeClr val="accent1"/>
+          </a:fillRef>
+          <a:effectRef idx="1">
+            <a:schemeClr val="accent1"/>
+          </a:effectRef>
+          <a:fontRef idx="minor">
+            <a:schemeClr val="tx1"/>
+          </a:fontRef>
+        </p:style>
+      </p:cxnSp>
+      <p:sp>
+        <p:nvSpPr>
+          <p:cNvPr id="66" name="文本框 65"/>
+          <p:cNvSpPr txBox="1"/>
+          <p:nvPr/>
+        </p:nvSpPr>
+        <p:spPr>
+          <a:xfrm>
+            <a:off x="2396141" y="3879415"/>
+            <a:ext cx="255198" cy="839974"/>
+          </a:xfrm>
+          <a:prstGeom prst="rect">
+            <a:avLst/>
+          </a:prstGeom>
+          <a:noFill/>
+          <a:ln w="3810">
+            <a:noFill/>
+          </a:ln>
+        </p:spPr>
+        <p:txBody>
+          <a:bodyPr wrap="none" rtlCol="0">
+            <a:spAutoFit/>
+          </a:bodyPr>
+          <a:lstStyle/>
+          <a:p>
+            <a:pPr algn="ctr">
+              <a:lnSpc>
+                <a:spcPct val="150000"/>
+              </a:lnSpc>
+            </a:pPr>
+            <a:r>
+              <a:rPr kumimoji="1" lang="zh-CN" altLang="zh-CN" sz="1100" dirty="0" smtClean="0"/>
+              <a:t>.</a:t>
+            </a:r>
+            <a:endParaRPr kumimoji="1" lang="en-US" altLang="zh-CN" sz="1100" dirty="0" smtClean="0"/>
+          </a:p>
+          <a:p>
+            <a:pPr algn="ctr">
+              <a:lnSpc>
+                <a:spcPct val="150000"/>
+              </a:lnSpc>
+            </a:pPr>
+            <a:r>
+              <a:rPr kumimoji="1" lang="zh-CN" altLang="zh-CN" sz="1100" dirty="0" smtClean="0"/>
+              <a:t>.</a:t>
+            </a:r>
+            <a:endParaRPr kumimoji="1" lang="en-US" altLang="zh-CN" sz="1100" dirty="0" smtClean="0"/>
+          </a:p>
+          <a:p>
+            <a:pPr algn="ctr">
+              <a:lnSpc>
+                <a:spcPct val="150000"/>
+              </a:lnSpc>
+            </a:pPr>
+            <a:r>
+              <a:rPr kumimoji="1" lang="zh-CN" altLang="zh-CN" sz="1100" dirty="0"/>
+              <a:t>.</a:t>
+            </a:r>
+            <a:endParaRPr kumimoji="1" lang="zh-CN" altLang="en-US" sz="1100" dirty="0"/>
+          </a:p>
+        </p:txBody>
+      </p:sp>
+      <p:sp>
+        <p:nvSpPr>
+          <p:cNvPr id="67" name="文本框 66"/>
+          <p:cNvSpPr txBox="1"/>
+          <p:nvPr/>
+        </p:nvSpPr>
+        <p:spPr>
+          <a:xfrm>
+            <a:off x="4691482" y="3962668"/>
+            <a:ext cx="255198" cy="839974"/>
+          </a:xfrm>
+          <a:prstGeom prst="rect">
+            <a:avLst/>
+          </a:prstGeom>
+          <a:noFill/>
+          <a:ln w="3810">
+            <a:noFill/>
+          </a:ln>
+        </p:spPr>
+        <p:txBody>
+          <a:bodyPr wrap="none" rtlCol="0">
+            <a:spAutoFit/>
+          </a:bodyPr>
+          <a:lstStyle/>
+          <a:p>
+            <a:pPr algn="ctr">
+              <a:lnSpc>
+                <a:spcPct val="150000"/>
+              </a:lnSpc>
+            </a:pPr>
+            <a:r>
+              <a:rPr kumimoji="1" lang="zh-CN" altLang="zh-CN" sz="1100" dirty="0" smtClean="0"/>
+              <a:t>.</a:t>
+            </a:r>
+            <a:endParaRPr kumimoji="1" lang="en-US" altLang="zh-CN" sz="1100" dirty="0" smtClean="0"/>
+          </a:p>
+          <a:p>
+            <a:pPr algn="ctr">
+              <a:lnSpc>
+                <a:spcPct val="150000"/>
+              </a:lnSpc>
+            </a:pPr>
+            <a:r>
+              <a:rPr kumimoji="1" lang="zh-CN" altLang="zh-CN" sz="1100" dirty="0" smtClean="0"/>
+              <a:t>.</a:t>
+            </a:r>
+            <a:endParaRPr kumimoji="1" lang="en-US" altLang="zh-CN" sz="1100" dirty="0" smtClean="0"/>
+          </a:p>
+          <a:p>
+            <a:pPr algn="ctr">
+              <a:lnSpc>
+                <a:spcPct val="150000"/>
+              </a:lnSpc>
+            </a:pPr>
+            <a:r>
+              <a:rPr kumimoji="1" lang="zh-CN" altLang="zh-CN" sz="1100" dirty="0"/>
+              <a:t>.</a:t>
+            </a:r>
+            <a:endParaRPr kumimoji="1" lang="zh-CN" altLang="en-US" sz="1100" dirty="0"/>
+          </a:p>
+        </p:txBody>
+      </p:sp>
+      <p:sp>
+        <p:nvSpPr>
+          <p:cNvPr id="68" name="文本框 67"/>
+          <p:cNvSpPr txBox="1"/>
+          <p:nvPr/>
+        </p:nvSpPr>
+        <p:spPr>
+          <a:xfrm>
+            <a:off x="3958814" y="3966837"/>
+            <a:ext cx="255198" cy="586058"/>
+          </a:xfrm>
+          <a:prstGeom prst="rect">
+            <a:avLst/>
+          </a:prstGeom>
+          <a:noFill/>
+          <a:ln w="3810">
+            <a:noFill/>
+          </a:ln>
+        </p:spPr>
+        <p:txBody>
+          <a:bodyPr wrap="none" rtlCol="0">
+            <a:spAutoFit/>
+          </a:bodyPr>
+          <a:lstStyle/>
+          <a:p>
+            <a:pPr algn="ctr">
+              <a:lnSpc>
+                <a:spcPct val="150000"/>
+              </a:lnSpc>
+            </a:pPr>
+            <a:r>
+              <a:rPr kumimoji="1" lang="zh-CN" altLang="zh-CN" sz="1100" dirty="0" smtClean="0"/>
+              <a:t>.</a:t>
+            </a:r>
+            <a:endParaRPr kumimoji="1" lang="en-US" altLang="zh-CN" sz="1100" dirty="0" smtClean="0"/>
+          </a:p>
+          <a:p>
+            <a:pPr algn="ctr">
+              <a:lnSpc>
+                <a:spcPct val="150000"/>
+              </a:lnSpc>
+            </a:pPr>
+            <a:r>
+              <a:rPr kumimoji="1" lang="zh-CN" altLang="zh-CN" sz="1100" dirty="0" smtClean="0"/>
+              <a:t>.</a:t>
+            </a:r>
+            <a:endParaRPr kumimoji="1" lang="en-US" altLang="zh-CN" sz="1100" dirty="0" smtClean="0"/>
+          </a:p>
+        </p:txBody>
+      </p:sp>
+      <p:sp>
+        <p:nvSpPr>
+          <p:cNvPr id="69" name="文本框 68"/>
+          <p:cNvSpPr txBox="1"/>
+          <p:nvPr/>
+        </p:nvSpPr>
+        <p:spPr>
+          <a:xfrm>
+            <a:off x="3132748" y="4064978"/>
+            <a:ext cx="255198" cy="586058"/>
+          </a:xfrm>
+          <a:prstGeom prst="rect">
+            <a:avLst/>
+          </a:prstGeom>
+          <a:noFill/>
+          <a:ln w="3810">
+            <a:noFill/>
+          </a:ln>
+        </p:spPr>
+        <p:txBody>
+          <a:bodyPr wrap="none" rtlCol="0">
+            <a:spAutoFit/>
+          </a:bodyPr>
+          <a:lstStyle/>
+          <a:p>
+            <a:pPr algn="ctr">
+              <a:lnSpc>
+                <a:spcPct val="150000"/>
+              </a:lnSpc>
+            </a:pPr>
+            <a:r>
+              <a:rPr kumimoji="1" lang="zh-CN" altLang="zh-CN" sz="1100" dirty="0" smtClean="0"/>
+              <a:t>.</a:t>
+            </a:r>
+            <a:endParaRPr kumimoji="1" lang="en-US" altLang="zh-CN" sz="1100" dirty="0" smtClean="0"/>
+          </a:p>
+          <a:p>
+            <a:pPr algn="ctr">
+              <a:lnSpc>
+                <a:spcPct val="150000"/>
+              </a:lnSpc>
+            </a:pPr>
+            <a:r>
+              <a:rPr kumimoji="1" lang="zh-CN" altLang="zh-CN" sz="1100" dirty="0" smtClean="0"/>
+              <a:t>.</a:t>
+            </a:r>
+            <a:endParaRPr kumimoji="1" lang="en-US" altLang="zh-CN" sz="1100" dirty="0" smtClean="0"/>
+          </a:p>
+        </p:txBody>
+      </p:sp>
+      <p:sp>
+        <p:nvSpPr>
+          <p:cNvPr id="70" name="文本框 69"/>
+          <p:cNvSpPr txBox="1"/>
+          <p:nvPr/>
+        </p:nvSpPr>
+        <p:spPr>
+          <a:xfrm>
+            <a:off x="2922256" y="2608020"/>
+            <a:ext cx="1402948" cy="307777"/>
+          </a:xfrm>
+          <a:prstGeom prst="rect">
+            <a:avLst/>
+          </a:prstGeom>
+          <a:noFill/>
+        </p:spPr>
+        <p:txBody>
+          <a:bodyPr wrap="none" rtlCol="0">
+            <a:spAutoFit/>
+          </a:bodyPr>
+          <a:lstStyle/>
+          <a:p>
+            <a:r>
+              <a:rPr kumimoji="1" lang="en-US" altLang="zh-CN" sz="1400" dirty="0" smtClean="0"/>
+              <a:t>Bottleneck</a:t>
+            </a:r>
+            <a:r>
+              <a:rPr kumimoji="1" lang="zh-CN" altLang="en-US" sz="1400" dirty="0" smtClean="0"/>
+              <a:t> </a:t>
+            </a:r>
+            <a:r>
+              <a:rPr kumimoji="1" lang="en-US" altLang="zh-CN" sz="1400" dirty="0" smtClean="0"/>
+              <a:t>Layer</a:t>
+            </a:r>
+            <a:endParaRPr kumimoji="1" lang="zh-CN" altLang="en-US" sz="1400" dirty="0"/>
+          </a:p>
+        </p:txBody>
+      </p:sp>
+      <p:cxnSp>
+        <p:nvCxnSpPr>
+          <p:cNvPr id="71" name="直线箭头连接符 70"/>
+          <p:cNvCxnSpPr/>
+          <p:nvPr/>
+        </p:nvCxnSpPr>
+        <p:spPr>
+          <a:xfrm>
+            <a:off x="3623560" y="3066002"/>
+            <a:ext cx="0" cy="860875"/>
+          </a:xfrm>
+          <a:prstGeom prst="straightConnector1">
+            <a:avLst/>
+          </a:prstGeom>
+          <a:ln w="3810">
+            <a:solidFill>
+              <a:schemeClr val="tx1"/>
+            </a:solidFill>
+            <a:tailEnd type="arrow"/>
+          </a:ln>
+        </p:spPr>
+        <p:style>
+          <a:lnRef idx="2">
+            <a:schemeClr val="accent1"/>
+          </a:lnRef>
+          <a:fillRef idx="0">
+            <a:schemeClr val="accent1"/>
+          </a:fillRef>
+          <a:effectRef idx="1">
+            <a:schemeClr val="accent1"/>
+          </a:effectRef>
+          <a:fontRef idx="minor">
+            <a:schemeClr val="tx1"/>
+          </a:fontRef>
+        </p:style>
+      </p:cxnSp>
+      <p:sp>
+        <p:nvSpPr>
+          <p:cNvPr id="73" name="文本框 72"/>
+          <p:cNvSpPr txBox="1"/>
+          <p:nvPr/>
+        </p:nvSpPr>
+        <p:spPr>
+          <a:xfrm>
+            <a:off x="2413902" y="5550343"/>
+            <a:ext cx="2419315" cy="307777"/>
+          </a:xfrm>
+          <a:prstGeom prst="rect">
+            <a:avLst/>
+          </a:prstGeom>
+          <a:noFill/>
+        </p:spPr>
+        <p:txBody>
+          <a:bodyPr wrap="none" rtlCol="0">
+            <a:spAutoFit/>
+          </a:bodyPr>
+          <a:lstStyle/>
+          <a:p>
+            <a:r>
+              <a:rPr kumimoji="1" lang="en-US" altLang="zh-CN" sz="1400" dirty="0" smtClean="0"/>
+              <a:t>Fully</a:t>
+            </a:r>
+            <a:r>
+              <a:rPr kumimoji="1" lang="zh-CN" altLang="en-US" sz="1400" dirty="0" smtClean="0"/>
+              <a:t> </a:t>
+            </a:r>
+            <a:r>
+              <a:rPr kumimoji="1" lang="en-US" altLang="zh-CN" sz="1400" dirty="0" smtClean="0"/>
+              <a:t>connected</a:t>
+            </a:r>
+            <a:r>
+              <a:rPr kumimoji="1" lang="zh-CN" altLang="en-US" sz="1400" dirty="0" smtClean="0"/>
+              <a:t> </a:t>
+            </a:r>
+            <a:r>
+              <a:rPr kumimoji="1" lang="en-US" altLang="zh-CN" sz="1400" dirty="0" smtClean="0"/>
+              <a:t>but</a:t>
+            </a:r>
+            <a:r>
+              <a:rPr kumimoji="1" lang="zh-CN" altLang="en-US" sz="1400" dirty="0" smtClean="0"/>
+              <a:t> </a:t>
+            </a:r>
+            <a:r>
+              <a:rPr kumimoji="1" lang="en-US" altLang="zh-CN" sz="1400" dirty="0" smtClean="0"/>
+              <a:t>not</a:t>
+            </a:r>
+            <a:r>
+              <a:rPr kumimoji="1" lang="zh-CN" altLang="en-US" sz="1400" dirty="0" smtClean="0"/>
+              <a:t> </a:t>
+            </a:r>
+            <a:r>
+              <a:rPr kumimoji="1" lang="en-US" altLang="zh-CN" sz="1400" dirty="0" smtClean="0"/>
+              <a:t>drawn</a:t>
+            </a:r>
+            <a:endParaRPr kumimoji="1" lang="zh-CN" altLang="en-US" sz="1400" dirty="0"/>
+          </a:p>
+        </p:txBody>
+      </p:sp>
+      <p:sp>
+        <p:nvSpPr>
+          <p:cNvPr id="74" name="文本框 73"/>
+          <p:cNvSpPr txBox="1"/>
+          <p:nvPr/>
+        </p:nvSpPr>
+        <p:spPr>
+          <a:xfrm>
+            <a:off x="887601" y="4328494"/>
+            <a:ext cx="979755" cy="307777"/>
+          </a:xfrm>
+          <a:prstGeom prst="rect">
+            <a:avLst/>
+          </a:prstGeom>
+          <a:noFill/>
+        </p:spPr>
+        <p:txBody>
+          <a:bodyPr wrap="none" rtlCol="0">
+            <a:spAutoFit/>
+          </a:bodyPr>
+          <a:lstStyle/>
+          <a:p>
+            <a:r>
+              <a:rPr kumimoji="1" lang="en-US" altLang="zh-CN" sz="1400" dirty="0" smtClean="0"/>
+              <a:t>Input</a:t>
+            </a:r>
+            <a:r>
+              <a:rPr kumimoji="1" lang="zh-CN" altLang="en-US" sz="1400" dirty="0" smtClean="0"/>
+              <a:t> </a:t>
+            </a:r>
+            <a:r>
+              <a:rPr kumimoji="1" lang="en-US" altLang="zh-CN" sz="1400" dirty="0" smtClean="0"/>
+              <a:t>layer</a:t>
+            </a:r>
+            <a:endParaRPr kumimoji="1" lang="zh-CN" altLang="en-US" sz="1400" dirty="0"/>
+          </a:p>
+        </p:txBody>
+      </p:sp>
+    </p:spTree>
+    <p:extLst>
+      <p:ext uri="{BB962C8B-B14F-4D97-AF65-F5344CB8AC3E}">
+        <p14:creationId xmlns:p14="http://schemas.microsoft.com/office/powerpoint/2010/main" val="4137956515"/>
       </p:ext>
     </p:extLst>
   </p:cSld>

</xml_diff>